<commit_message>
docs: update README with Agent Memory notes and resources; modify user references in vector_store
</commit_message>
<xml_diff>
--- a/media/Agent Memory.pptx
+++ b/media/Agent Memory.pptx
@@ -13,6 +13,8 @@
     <p:sldId id="261" r:id="rId7"/>
     <p:sldId id="263" r:id="rId8"/>
     <p:sldId id="265" r:id="rId9"/>
+    <p:sldId id="266" r:id="rId10"/>
+    <p:sldId id="267" r:id="rId11"/>
   </p:sldIdLst>
   <p:sldSz cx="12192000" cy="6858000"/>
   <p:notesSz cx="6858000" cy="9144000"/>
@@ -122,7 +124,7 @@
 <file path=ppt/revisionInfo.xml><?xml version="1.0" encoding="utf-8"?>
 <p1510:revInfo xmlns:a="http://schemas.openxmlformats.org/drawingml/2006/main" xmlns:r="http://schemas.openxmlformats.org/officeDocument/2006/relationships" xmlns:p1510="http://schemas.microsoft.com/office/powerpoint/2015/10/main">
   <p1510:revLst>
-    <p1510:client id="{8AD29B48-BC9A-437A-8404-02CD7A233439}" v="322" dt="2025-07-29T08:48:34.987"/>
+    <p1510:client id="{8AD29B48-BC9A-437A-8404-02CD7A233439}" v="1196" dt="2025-07-29T17:16:52.180"/>
   </p1510:revLst>
 </p1510:revInfo>
 </file>
@@ -131,8 +133,8 @@
 <pc:chgInfo xmlns:a="http://schemas.openxmlformats.org/drawingml/2006/main" xmlns:r="http://schemas.openxmlformats.org/officeDocument/2006/relationships" xmlns:ac="http://schemas.microsoft.com/office/drawing/2013/main/command" xmlns:pc="http://schemas.microsoft.com/office/powerpoint/2013/main/command">
   <pc:docChgLst>
     <pc:chgData name="Cardiel Pérez, Iria" userId="8dbc90f3-a808-4c45-b25b-bbf0bb79f7b8" providerId="ADAL" clId="{8AD29B48-BC9A-437A-8404-02CD7A233439}"/>
-    <pc:docChg chg="undo custSel addSld delSld modSld">
-      <pc:chgData name="Cardiel Pérez, Iria" userId="8dbc90f3-a808-4c45-b25b-bbf0bb79f7b8" providerId="ADAL" clId="{8AD29B48-BC9A-437A-8404-02CD7A233439}" dt="2025-07-29T08:48:51.035" v="1521" actId="20577"/>
+    <pc:docChg chg="undo redo custSel addSld delSld modSld">
+      <pc:chgData name="Cardiel Pérez, Iria" userId="8dbc90f3-a808-4c45-b25b-bbf0bb79f7b8" providerId="ADAL" clId="{8AD29B48-BC9A-437A-8404-02CD7A233439}" dt="2025-07-29T17:20:04.461" v="3522" actId="1076"/>
       <pc:docMkLst>
         <pc:docMk/>
       </pc:docMkLst>
@@ -1237,11 +1239,27 @@
         </pc:spChg>
       </pc:sldChg>
       <pc:sldChg chg="addSp delSp modSp add mod">
-        <pc:chgData name="Cardiel Pérez, Iria" userId="8dbc90f3-a808-4c45-b25b-bbf0bb79f7b8" providerId="ADAL" clId="{8AD29B48-BC9A-437A-8404-02CD7A233439}" dt="2025-07-29T08:48:51.035" v="1521" actId="20577"/>
+        <pc:chgData name="Cardiel Pérez, Iria" userId="8dbc90f3-a808-4c45-b25b-bbf0bb79f7b8" providerId="ADAL" clId="{8AD29B48-BC9A-437A-8404-02CD7A233439}" dt="2025-07-29T17:15:54.825" v="3454" actId="20577"/>
         <pc:sldMkLst>
           <pc:docMk/>
           <pc:sldMk cId="3857995518" sldId="265"/>
         </pc:sldMkLst>
+        <pc:spChg chg="add del mod">
+          <ac:chgData name="Cardiel Pérez, Iria" userId="8dbc90f3-a808-4c45-b25b-bbf0bb79f7b8" providerId="ADAL" clId="{8AD29B48-BC9A-437A-8404-02CD7A233439}" dt="2025-07-29T16:48:36.679" v="1978" actId="478"/>
+          <ac:spMkLst>
+            <pc:docMk/>
+            <pc:sldMk cId="3857995518" sldId="265"/>
+            <ac:spMk id="2" creationId="{F5583FB3-20BD-D252-A51A-440A7156524A}"/>
+          </ac:spMkLst>
+        </pc:spChg>
+        <pc:spChg chg="add del mod">
+          <ac:chgData name="Cardiel Pérez, Iria" userId="8dbc90f3-a808-4c45-b25b-bbf0bb79f7b8" providerId="ADAL" clId="{8AD29B48-BC9A-437A-8404-02CD7A233439}" dt="2025-07-29T16:48:38.701" v="1979" actId="478"/>
+          <ac:spMkLst>
+            <pc:docMk/>
+            <pc:sldMk cId="3857995518" sldId="265"/>
+            <ac:spMk id="3" creationId="{485A0C99-4087-411E-77AE-3D9478ADA785}"/>
+          </ac:spMkLst>
+        </pc:spChg>
         <pc:spChg chg="mod">
           <ac:chgData name="Cardiel Pérez, Iria" userId="8dbc90f3-a808-4c45-b25b-bbf0bb79f7b8" providerId="ADAL" clId="{8AD29B48-BC9A-437A-8404-02CD7A233439}" dt="2025-07-29T08:48:51.035" v="1521" actId="20577"/>
           <ac:spMkLst>
@@ -1259,11 +1277,27 @@
           </ac:spMkLst>
         </pc:spChg>
         <pc:spChg chg="add del mod">
+          <ac:chgData name="Cardiel Pérez, Iria" userId="8dbc90f3-a808-4c45-b25b-bbf0bb79f7b8" providerId="ADAL" clId="{8AD29B48-BC9A-437A-8404-02CD7A233439}" dt="2025-07-29T16:48:36.679" v="1978" actId="478"/>
+          <ac:spMkLst>
+            <pc:docMk/>
+            <pc:sldMk cId="3857995518" sldId="265"/>
+            <ac:spMk id="6" creationId="{72110084-B9E8-EB96-CE61-D9839B8410C3}"/>
+          </ac:spMkLst>
+        </pc:spChg>
+        <pc:spChg chg="add del mod">
           <ac:chgData name="Cardiel Pérez, Iria" userId="8dbc90f3-a808-4c45-b25b-bbf0bb79f7b8" providerId="ADAL" clId="{8AD29B48-BC9A-437A-8404-02CD7A233439}" dt="2025-07-29T08:48:39.714" v="1498" actId="478"/>
           <ac:spMkLst>
             <pc:docMk/>
             <pc:sldMk cId="3857995518" sldId="265"/>
             <ac:spMk id="6" creationId="{73BF106D-4312-18BA-172C-D24C90F53E5A}"/>
+          </ac:spMkLst>
+        </pc:spChg>
+        <pc:spChg chg="add mod">
+          <ac:chgData name="Cardiel Pérez, Iria" userId="8dbc90f3-a808-4c45-b25b-bbf0bb79f7b8" providerId="ADAL" clId="{8AD29B48-BC9A-437A-8404-02CD7A233439}" dt="2025-07-29T17:15:54.825" v="3454" actId="20577"/>
+          <ac:spMkLst>
+            <pc:docMk/>
+            <pc:sldMk cId="3857995518" sldId="265"/>
+            <ac:spMk id="7" creationId="{BFAD0CFA-A664-B240-9DCE-4CD5027ED7EE}"/>
           </ac:spMkLst>
         </pc:spChg>
         <pc:spChg chg="del">
@@ -1274,6 +1308,142 @@
             <ac:spMk id="7" creationId="{D331F775-86FB-BB29-B00C-5AD4DE365A50}"/>
           </ac:spMkLst>
         </pc:spChg>
+        <pc:spChg chg="add del mod">
+          <ac:chgData name="Cardiel Pérez, Iria" userId="8dbc90f3-a808-4c45-b25b-bbf0bb79f7b8" providerId="ADAL" clId="{8AD29B48-BC9A-437A-8404-02CD7A233439}" dt="2025-07-29T16:49:24.083" v="2015" actId="478"/>
+          <ac:spMkLst>
+            <pc:docMk/>
+            <pc:sldMk cId="3857995518" sldId="265"/>
+            <ac:spMk id="8" creationId="{572F6D9B-FE9F-D13C-1822-1B241873C2AA}"/>
+          </ac:spMkLst>
+        </pc:spChg>
+        <pc:spChg chg="add mod">
+          <ac:chgData name="Cardiel Pérez, Iria" userId="8dbc90f3-a808-4c45-b25b-bbf0bb79f7b8" providerId="ADAL" clId="{8AD29B48-BC9A-437A-8404-02CD7A233439}" dt="2025-07-29T17:02:10.688" v="2858" actId="14100"/>
+          <ac:spMkLst>
+            <pc:docMk/>
+            <pc:sldMk cId="3857995518" sldId="265"/>
+            <ac:spMk id="9" creationId="{F6D6DE86-CE9B-4647-6912-54E09961A763}"/>
+          </ac:spMkLst>
+        </pc:spChg>
+        <pc:spChg chg="add mod">
+          <ac:chgData name="Cardiel Pérez, Iria" userId="8dbc90f3-a808-4c45-b25b-bbf0bb79f7b8" providerId="ADAL" clId="{8AD29B48-BC9A-437A-8404-02CD7A233439}" dt="2025-07-29T17:02:06.027" v="2857" actId="1076"/>
+          <ac:spMkLst>
+            <pc:docMk/>
+            <pc:sldMk cId="3857995518" sldId="265"/>
+            <ac:spMk id="10" creationId="{0EE929B7-BA34-ABDC-8E07-5CFE14C177B4}"/>
+          </ac:spMkLst>
+        </pc:spChg>
+        <pc:spChg chg="add mod">
+          <ac:chgData name="Cardiel Pérez, Iria" userId="8dbc90f3-a808-4c45-b25b-bbf0bb79f7b8" providerId="ADAL" clId="{8AD29B48-BC9A-437A-8404-02CD7A233439}" dt="2025-07-29T17:14:16.908" v="3383" actId="20577"/>
+          <ac:spMkLst>
+            <pc:docMk/>
+            <pc:sldMk cId="3857995518" sldId="265"/>
+            <ac:spMk id="12" creationId="{B88A100E-BB6F-E6A3-7A89-DB0C76426E81}"/>
+          </ac:spMkLst>
+        </pc:spChg>
+        <pc:spChg chg="add mod">
+          <ac:chgData name="Cardiel Pérez, Iria" userId="8dbc90f3-a808-4c45-b25b-bbf0bb79f7b8" providerId="ADAL" clId="{8AD29B48-BC9A-437A-8404-02CD7A233439}" dt="2025-07-29T17:14:22.341" v="3401" actId="20577"/>
+          <ac:spMkLst>
+            <pc:docMk/>
+            <pc:sldMk cId="3857995518" sldId="265"/>
+            <ac:spMk id="13" creationId="{24BE66D6-07A0-9586-003D-B363847877F2}"/>
+          </ac:spMkLst>
+        </pc:spChg>
+        <pc:spChg chg="add mod">
+          <ac:chgData name="Cardiel Pérez, Iria" userId="8dbc90f3-a808-4c45-b25b-bbf0bb79f7b8" providerId="ADAL" clId="{8AD29B48-BC9A-437A-8404-02CD7A233439}" dt="2025-07-29T17:14:34.393" v="3411" actId="14100"/>
+          <ac:spMkLst>
+            <pc:docMk/>
+            <pc:sldMk cId="3857995518" sldId="265"/>
+            <ac:spMk id="14" creationId="{520B8622-A4A0-0F7F-26A6-6AD7652B37A5}"/>
+          </ac:spMkLst>
+        </pc:spChg>
+        <pc:spChg chg="add mod">
+          <ac:chgData name="Cardiel Pérez, Iria" userId="8dbc90f3-a808-4c45-b25b-bbf0bb79f7b8" providerId="ADAL" clId="{8AD29B48-BC9A-437A-8404-02CD7A233439}" dt="2025-07-29T17:07:00.698" v="2969" actId="14100"/>
+          <ac:spMkLst>
+            <pc:docMk/>
+            <pc:sldMk cId="3857995518" sldId="265"/>
+            <ac:spMk id="15" creationId="{E28186F2-0138-D1AD-6208-993E2B5E1BC7}"/>
+          </ac:spMkLst>
+        </pc:spChg>
+        <pc:spChg chg="add del mod">
+          <ac:chgData name="Cardiel Pérez, Iria" userId="8dbc90f3-a808-4c45-b25b-bbf0bb79f7b8" providerId="ADAL" clId="{8AD29B48-BC9A-437A-8404-02CD7A233439}" dt="2025-07-29T17:07:48.640" v="2995" actId="478"/>
+          <ac:spMkLst>
+            <pc:docMk/>
+            <pc:sldMk cId="3857995518" sldId="265"/>
+            <ac:spMk id="57" creationId="{C343E3E0-05CC-A976-364B-7215CAA280B8}"/>
+          </ac:spMkLst>
+        </pc:spChg>
+        <pc:spChg chg="add del mod">
+          <ac:chgData name="Cardiel Pérez, Iria" userId="8dbc90f3-a808-4c45-b25b-bbf0bb79f7b8" providerId="ADAL" clId="{8AD29B48-BC9A-437A-8404-02CD7A233439}" dt="2025-07-29T17:07:54.340" v="2997" actId="478"/>
+          <ac:spMkLst>
+            <pc:docMk/>
+            <pc:sldMk cId="3857995518" sldId="265"/>
+            <ac:spMk id="58" creationId="{97C96059-3856-DDE1-CE68-4747512296D1}"/>
+          </ac:spMkLst>
+        </pc:spChg>
+        <pc:spChg chg="add mod">
+          <ac:chgData name="Cardiel Pérez, Iria" userId="8dbc90f3-a808-4c45-b25b-bbf0bb79f7b8" providerId="ADAL" clId="{8AD29B48-BC9A-437A-8404-02CD7A233439}" dt="2025-07-29T17:15:08.691" v="3452" actId="20577"/>
+          <ac:spMkLst>
+            <pc:docMk/>
+            <pc:sldMk cId="3857995518" sldId="265"/>
+            <ac:spMk id="59" creationId="{A8B8D36F-E946-7BAE-614F-71E5EEB713F3}"/>
+          </ac:spMkLst>
+        </pc:spChg>
+        <pc:spChg chg="add mod">
+          <ac:chgData name="Cardiel Pérez, Iria" userId="8dbc90f3-a808-4c45-b25b-bbf0bb79f7b8" providerId="ADAL" clId="{8AD29B48-BC9A-437A-8404-02CD7A233439}" dt="2025-07-29T17:06:32.370" v="2963" actId="12788"/>
+          <ac:spMkLst>
+            <pc:docMk/>
+            <pc:sldMk cId="3857995518" sldId="265"/>
+            <ac:spMk id="69" creationId="{46B10392-1062-9DA3-90D4-05295F2598F3}"/>
+          </ac:spMkLst>
+        </pc:spChg>
+        <pc:spChg chg="add mod">
+          <ac:chgData name="Cardiel Pérez, Iria" userId="8dbc90f3-a808-4c45-b25b-bbf0bb79f7b8" providerId="ADAL" clId="{8AD29B48-BC9A-437A-8404-02CD7A233439}" dt="2025-07-29T17:06:32.370" v="2963" actId="12788"/>
+          <ac:spMkLst>
+            <pc:docMk/>
+            <pc:sldMk cId="3857995518" sldId="265"/>
+            <ac:spMk id="70" creationId="{62210D3D-1723-2D39-B430-597D250F45EE}"/>
+          </ac:spMkLst>
+        </pc:spChg>
+        <pc:spChg chg="add mod">
+          <ac:chgData name="Cardiel Pérez, Iria" userId="8dbc90f3-a808-4c45-b25b-bbf0bb79f7b8" providerId="ADAL" clId="{8AD29B48-BC9A-437A-8404-02CD7A233439}" dt="2025-07-29T17:07:52.710" v="2996" actId="1076"/>
+          <ac:spMkLst>
+            <pc:docMk/>
+            <pc:sldMk cId="3857995518" sldId="265"/>
+            <ac:spMk id="103" creationId="{B9D95E81-DB28-240B-1A0A-0607560F5BF2}"/>
+          </ac:spMkLst>
+        </pc:spChg>
+        <pc:spChg chg="add mod">
+          <ac:chgData name="Cardiel Pérez, Iria" userId="8dbc90f3-a808-4c45-b25b-bbf0bb79f7b8" providerId="ADAL" clId="{8AD29B48-BC9A-437A-8404-02CD7A233439}" dt="2025-07-29T17:07:59.800" v="3000" actId="1076"/>
+          <ac:spMkLst>
+            <pc:docMk/>
+            <pc:sldMk cId="3857995518" sldId="265"/>
+            <ac:spMk id="104" creationId="{72832AC5-15B6-087C-C64A-7D5090EDEB55}"/>
+          </ac:spMkLst>
+        </pc:spChg>
+        <pc:spChg chg="add mod">
+          <ac:chgData name="Cardiel Pérez, Iria" userId="8dbc90f3-a808-4c45-b25b-bbf0bb79f7b8" providerId="ADAL" clId="{8AD29B48-BC9A-437A-8404-02CD7A233439}" dt="2025-07-29T17:08:11.880" v="3011"/>
+          <ac:spMkLst>
+            <pc:docMk/>
+            <pc:sldMk cId="3857995518" sldId="265"/>
+            <ac:spMk id="105" creationId="{082C6A73-6CA7-4127-7842-BEDAC5CC2BAF}"/>
+          </ac:spMkLst>
+        </pc:spChg>
+        <pc:spChg chg="add mod">
+          <ac:chgData name="Cardiel Pérez, Iria" userId="8dbc90f3-a808-4c45-b25b-bbf0bb79f7b8" providerId="ADAL" clId="{8AD29B48-BC9A-437A-8404-02CD7A233439}" dt="2025-07-29T17:13:50.120" v="3342" actId="1076"/>
+          <ac:spMkLst>
+            <pc:docMk/>
+            <pc:sldMk cId="3857995518" sldId="265"/>
+            <ac:spMk id="106" creationId="{CE01D967-EF46-E62F-9F76-30FDE6C63C87}"/>
+          </ac:spMkLst>
+        </pc:spChg>
+        <pc:spChg chg="add mod">
+          <ac:chgData name="Cardiel Pérez, Iria" userId="8dbc90f3-a808-4c45-b25b-bbf0bb79f7b8" providerId="ADAL" clId="{8AD29B48-BC9A-437A-8404-02CD7A233439}" dt="2025-07-29T17:14:07.057" v="3367" actId="20577"/>
+          <ac:spMkLst>
+            <pc:docMk/>
+            <pc:sldMk cId="3857995518" sldId="265"/>
+            <ac:spMk id="107" creationId="{92C44D70-655B-5799-D1BE-84237E86B0CD}"/>
+          </ac:spMkLst>
+        </pc:spChg>
         <pc:picChg chg="del">
           <ac:chgData name="Cardiel Pérez, Iria" userId="8dbc90f3-a808-4c45-b25b-bbf0bb79f7b8" providerId="ADAL" clId="{8AD29B48-BC9A-437A-8404-02CD7A233439}" dt="2025-07-29T08:48:34.986" v="1495" actId="478"/>
           <ac:picMkLst>
@@ -1282,6 +1452,164 @@
             <ac:picMk id="3" creationId="{781BEAFA-9830-3633-ED2A-90BD2F045747}"/>
           </ac:picMkLst>
         </pc:picChg>
+        <pc:cxnChg chg="add mod">
+          <ac:chgData name="Cardiel Pérez, Iria" userId="8dbc90f3-a808-4c45-b25b-bbf0bb79f7b8" providerId="ADAL" clId="{8AD29B48-BC9A-437A-8404-02CD7A233439}" dt="2025-07-29T17:14:34.393" v="3411" actId="14100"/>
+          <ac:cxnSpMkLst>
+            <pc:docMk/>
+            <pc:sldMk cId="3857995518" sldId="265"/>
+            <ac:cxnSpMk id="17" creationId="{6044D633-94CC-C7C2-F7F9-A32FE14EEED7}"/>
+          </ac:cxnSpMkLst>
+        </pc:cxnChg>
+        <pc:cxnChg chg="add mod">
+          <ac:chgData name="Cardiel Pérez, Iria" userId="8dbc90f3-a808-4c45-b25b-bbf0bb79f7b8" providerId="ADAL" clId="{8AD29B48-BC9A-437A-8404-02CD7A233439}" dt="2025-07-29T17:07:48.640" v="2995" actId="478"/>
+          <ac:cxnSpMkLst>
+            <pc:docMk/>
+            <pc:sldMk cId="3857995518" sldId="265"/>
+            <ac:cxnSpMk id="22" creationId="{149A157C-2185-420B-D69C-3D9667E2E079}"/>
+          </ac:cxnSpMkLst>
+        </pc:cxnChg>
+        <pc:cxnChg chg="add mod">
+          <ac:chgData name="Cardiel Pérez, Iria" userId="8dbc90f3-a808-4c45-b25b-bbf0bb79f7b8" providerId="ADAL" clId="{8AD29B48-BC9A-437A-8404-02CD7A233439}" dt="2025-07-29T17:14:34.393" v="3411" actId="14100"/>
+          <ac:cxnSpMkLst>
+            <pc:docMk/>
+            <pc:sldMk cId="3857995518" sldId="265"/>
+            <ac:cxnSpMk id="25" creationId="{9FBF4257-C33A-F543-FC02-EE45817DE6C9}"/>
+          </ac:cxnSpMkLst>
+        </pc:cxnChg>
+        <pc:cxnChg chg="add mod">
+          <ac:chgData name="Cardiel Pérez, Iria" userId="8dbc90f3-a808-4c45-b25b-bbf0bb79f7b8" providerId="ADAL" clId="{8AD29B48-BC9A-437A-8404-02CD7A233439}" dt="2025-07-29T17:07:54.340" v="2997" actId="478"/>
+          <ac:cxnSpMkLst>
+            <pc:docMk/>
+            <pc:sldMk cId="3857995518" sldId="265"/>
+            <ac:cxnSpMk id="29" creationId="{07450C19-EAE5-C71F-AD83-6436874A206F}"/>
+          </ac:cxnSpMkLst>
+        </pc:cxnChg>
+        <pc:cxnChg chg="add mod">
+          <ac:chgData name="Cardiel Pérez, Iria" userId="8dbc90f3-a808-4c45-b25b-bbf0bb79f7b8" providerId="ADAL" clId="{8AD29B48-BC9A-437A-8404-02CD7A233439}" dt="2025-07-29T17:02:43.887" v="2870" actId="14100"/>
+          <ac:cxnSpMkLst>
+            <pc:docMk/>
+            <pc:sldMk cId="3857995518" sldId="265"/>
+            <ac:cxnSpMk id="35" creationId="{4239DB04-2188-7381-ABF3-D565A4B01E64}"/>
+          </ac:cxnSpMkLst>
+        </pc:cxnChg>
+        <pc:cxnChg chg="add mod">
+          <ac:chgData name="Cardiel Pérez, Iria" userId="8dbc90f3-a808-4c45-b25b-bbf0bb79f7b8" providerId="ADAL" clId="{8AD29B48-BC9A-437A-8404-02CD7A233439}" dt="2025-07-29T17:07:00.698" v="2969" actId="14100"/>
+          <ac:cxnSpMkLst>
+            <pc:docMk/>
+            <pc:sldMk cId="3857995518" sldId="265"/>
+            <ac:cxnSpMk id="39" creationId="{88A26C07-06E5-8581-4FF3-D55890305285}"/>
+          </ac:cxnSpMkLst>
+        </pc:cxnChg>
+        <pc:cxnChg chg="add mod">
+          <ac:chgData name="Cardiel Pérez, Iria" userId="8dbc90f3-a808-4c45-b25b-bbf0bb79f7b8" providerId="ADAL" clId="{8AD29B48-BC9A-437A-8404-02CD7A233439}" dt="2025-07-29T17:07:00.698" v="2969" actId="14100"/>
+          <ac:cxnSpMkLst>
+            <pc:docMk/>
+            <pc:sldMk cId="3857995518" sldId="265"/>
+            <ac:cxnSpMk id="42" creationId="{07C18EE3-900C-5FF3-5FF0-799DC497E6CA}"/>
+          </ac:cxnSpMkLst>
+        </pc:cxnChg>
+        <pc:cxnChg chg="add mod">
+          <ac:chgData name="Cardiel Pérez, Iria" userId="8dbc90f3-a808-4c45-b25b-bbf0bb79f7b8" providerId="ADAL" clId="{8AD29B48-BC9A-437A-8404-02CD7A233439}" dt="2025-07-29T17:07:00.698" v="2969" actId="14100"/>
+          <ac:cxnSpMkLst>
+            <pc:docMk/>
+            <pc:sldMk cId="3857995518" sldId="265"/>
+            <ac:cxnSpMk id="47" creationId="{E4421255-1246-EB9F-D05D-B53A1CF13B76}"/>
+          </ac:cxnSpMkLst>
+        </pc:cxnChg>
+        <pc:cxnChg chg="add mod">
+          <ac:chgData name="Cardiel Pérez, Iria" userId="8dbc90f3-a808-4c45-b25b-bbf0bb79f7b8" providerId="ADAL" clId="{8AD29B48-BC9A-437A-8404-02CD7A233439}" dt="2025-07-29T17:06:32.370" v="2963" actId="12788"/>
+          <ac:cxnSpMkLst>
+            <pc:docMk/>
+            <pc:sldMk cId="3857995518" sldId="265"/>
+            <ac:cxnSpMk id="82" creationId="{D85AD7B0-24D9-C009-E51C-475A506C8D83}"/>
+          </ac:cxnSpMkLst>
+        </pc:cxnChg>
+        <pc:cxnChg chg="add mod">
+          <ac:chgData name="Cardiel Pérez, Iria" userId="8dbc90f3-a808-4c45-b25b-bbf0bb79f7b8" providerId="ADAL" clId="{8AD29B48-BC9A-437A-8404-02CD7A233439}" dt="2025-07-29T17:06:32.370" v="2963" actId="12788"/>
+          <ac:cxnSpMkLst>
+            <pc:docMk/>
+            <pc:sldMk cId="3857995518" sldId="265"/>
+            <ac:cxnSpMk id="89" creationId="{AD728D71-6A65-B046-B45C-48C529704AFA}"/>
+          </ac:cxnSpMkLst>
+        </pc:cxnChg>
+      </pc:sldChg>
+      <pc:sldChg chg="addSp delSp modSp add mod">
+        <pc:chgData name="Cardiel Pérez, Iria" userId="8dbc90f3-a808-4c45-b25b-bbf0bb79f7b8" providerId="ADAL" clId="{8AD29B48-BC9A-437A-8404-02CD7A233439}" dt="2025-07-29T17:20:04.461" v="3522" actId="1076"/>
+        <pc:sldMkLst>
+          <pc:docMk/>
+          <pc:sldMk cId="2516498561" sldId="266"/>
+        </pc:sldMkLst>
+        <pc:spChg chg="mod">
+          <ac:chgData name="Cardiel Pérez, Iria" userId="8dbc90f3-a808-4c45-b25b-bbf0bb79f7b8" providerId="ADAL" clId="{8AD29B48-BC9A-437A-8404-02CD7A233439}" dt="2025-07-29T17:16:56.101" v="3469" actId="1076"/>
+          <ac:spMkLst>
+            <pc:docMk/>
+            <pc:sldMk cId="2516498561" sldId="266"/>
+            <ac:spMk id="2" creationId="{5C49B147-5917-209A-20BC-82E3A1E39701}"/>
+          </ac:spMkLst>
+        </pc:spChg>
+        <pc:spChg chg="mod">
+          <ac:chgData name="Cardiel Pérez, Iria" userId="8dbc90f3-a808-4c45-b25b-bbf0bb79f7b8" providerId="ADAL" clId="{8AD29B48-BC9A-437A-8404-02CD7A233439}" dt="2025-07-29T17:17:10.378" v="3500" actId="20577"/>
+          <ac:spMkLst>
+            <pc:docMk/>
+            <pc:sldMk cId="2516498561" sldId="266"/>
+            <ac:spMk id="3" creationId="{7FD723BA-D8DA-9585-8D12-63F8B5516A35}"/>
+          </ac:spMkLst>
+        </pc:spChg>
+        <pc:spChg chg="mod">
+          <ac:chgData name="Cardiel Pérez, Iria" userId="8dbc90f3-a808-4c45-b25b-bbf0bb79f7b8" providerId="ADAL" clId="{8AD29B48-BC9A-437A-8404-02CD7A233439}" dt="2025-07-29T17:09:35.049" v="3064" actId="20577"/>
+          <ac:spMkLst>
+            <pc:docMk/>
+            <pc:sldMk cId="2516498561" sldId="266"/>
+            <ac:spMk id="4" creationId="{58D08AC1-1419-E22B-0F20-8A1F7027064C}"/>
+          </ac:spMkLst>
+        </pc:spChg>
+        <pc:spChg chg="del mod">
+          <ac:chgData name="Cardiel Pérez, Iria" userId="8dbc90f3-a808-4c45-b25b-bbf0bb79f7b8" providerId="ADAL" clId="{8AD29B48-BC9A-437A-8404-02CD7A233439}" dt="2025-07-29T17:17:20.241" v="3504" actId="478"/>
+          <ac:spMkLst>
+            <pc:docMk/>
+            <pc:sldMk cId="2516498561" sldId="266"/>
+            <ac:spMk id="6" creationId="{0C910CBD-91B0-43D1-B280-DA1EB7FB484F}"/>
+          </ac:spMkLst>
+        </pc:spChg>
+        <pc:picChg chg="add del mod">
+          <ac:chgData name="Cardiel Pérez, Iria" userId="8dbc90f3-a808-4c45-b25b-bbf0bb79f7b8" providerId="ADAL" clId="{8AD29B48-BC9A-437A-8404-02CD7A233439}" dt="2025-07-29T17:19:23.696" v="3507" actId="478"/>
+          <ac:picMkLst>
+            <pc:docMk/>
+            <pc:sldMk cId="2516498561" sldId="266"/>
+            <ac:picMk id="8" creationId="{2518CC52-EFCB-BAC0-D16E-C44067C4E741}"/>
+          </ac:picMkLst>
+        </pc:picChg>
+        <pc:picChg chg="add del mod">
+          <ac:chgData name="Cardiel Pérez, Iria" userId="8dbc90f3-a808-4c45-b25b-bbf0bb79f7b8" providerId="ADAL" clId="{8AD29B48-BC9A-437A-8404-02CD7A233439}" dt="2025-07-29T17:19:25.159" v="3508" actId="478"/>
+          <ac:picMkLst>
+            <pc:docMk/>
+            <pc:sldMk cId="2516498561" sldId="266"/>
+            <ac:picMk id="10" creationId="{2955076C-80E5-E853-92A0-3449480A9D83}"/>
+          </ac:picMkLst>
+        </pc:picChg>
+        <pc:picChg chg="add mod">
+          <ac:chgData name="Cardiel Pérez, Iria" userId="8dbc90f3-a808-4c45-b25b-bbf0bb79f7b8" providerId="ADAL" clId="{8AD29B48-BC9A-437A-8404-02CD7A233439}" dt="2025-07-29T17:20:04.461" v="3522" actId="1076"/>
+          <ac:picMkLst>
+            <pc:docMk/>
+            <pc:sldMk cId="2516498561" sldId="266"/>
+            <ac:picMk id="12" creationId="{BFED0048-C58D-AF80-18D1-CF6182D5CAF8}"/>
+          </ac:picMkLst>
+        </pc:picChg>
+        <pc:picChg chg="add mod">
+          <ac:chgData name="Cardiel Pérez, Iria" userId="8dbc90f3-a808-4c45-b25b-bbf0bb79f7b8" providerId="ADAL" clId="{8AD29B48-BC9A-437A-8404-02CD7A233439}" dt="2025-07-29T17:20:04.461" v="3522" actId="1076"/>
+          <ac:picMkLst>
+            <pc:docMk/>
+            <pc:sldMk cId="2516498561" sldId="266"/>
+            <ac:picMk id="14" creationId="{F3DBD3BE-38D6-99D9-B290-735AA61255BF}"/>
+          </ac:picMkLst>
+        </pc:picChg>
+      </pc:sldChg>
+      <pc:sldChg chg="new">
+        <pc:chgData name="Cardiel Pérez, Iria" userId="8dbc90f3-a808-4c45-b25b-bbf0bb79f7b8" providerId="ADAL" clId="{8AD29B48-BC9A-437A-8404-02CD7A233439}" dt="2025-07-29T17:09:11.450" v="3019" actId="680"/>
+        <pc:sldMkLst>
+          <pc:docMk/>
+          <pc:sldMk cId="706667996" sldId="267"/>
+        </pc:sldMkLst>
       </pc:sldChg>
     </pc:docChg>
   </pc:docChgLst>
@@ -4643,6 +4971,111 @@
 </p:sld>
 </file>
 
+<file path=ppt/slides/slide10.xml><?xml version="1.0" encoding="utf-8"?>
+<p:sld xmlns:a="http://schemas.openxmlformats.org/drawingml/2006/main" xmlns:r="http://schemas.openxmlformats.org/officeDocument/2006/relationships" xmlns:p="http://schemas.openxmlformats.org/presentationml/2006/main">
+  <p:cSld>
+    <p:spTree>
+      <p:nvGrpSpPr>
+        <p:cNvPr id="1" name=""/>
+        <p:cNvGrpSpPr/>
+        <p:nvPr/>
+      </p:nvGrpSpPr>
+      <p:grpSpPr>
+        <a:xfrm>
+          <a:off x="0" y="0"/>
+          <a:ext cx="0" cy="0"/>
+          <a:chOff x="0" y="0"/>
+          <a:chExt cx="0" cy="0"/>
+        </a:xfrm>
+      </p:grpSpPr>
+      <p:sp>
+        <p:nvSpPr>
+          <p:cNvPr id="2" name="Title 1">
+            <a:extLst>
+              <a:ext uri="{FF2B5EF4-FFF2-40B4-BE49-F238E27FC236}">
+                <a16:creationId xmlns:a16="http://schemas.microsoft.com/office/drawing/2014/main" id="{2990FB45-436E-F0B3-990A-146B5781F93A}"/>
+              </a:ext>
+            </a:extLst>
+          </p:cNvPr>
+          <p:cNvSpPr>
+            <a:spLocks noGrp="1"/>
+          </p:cNvSpPr>
+          <p:nvPr>
+            <p:ph type="title"/>
+          </p:nvPr>
+        </p:nvSpPr>
+        <p:spPr/>
+        <p:txBody>
+          <a:bodyPr/>
+          <a:lstStyle/>
+          <a:p>
+            <a:endParaRPr lang="en-US"/>
+          </a:p>
+        </p:txBody>
+      </p:sp>
+      <p:sp>
+        <p:nvSpPr>
+          <p:cNvPr id="3" name="Content Placeholder 2">
+            <a:extLst>
+              <a:ext uri="{FF2B5EF4-FFF2-40B4-BE49-F238E27FC236}">
+                <a16:creationId xmlns:a16="http://schemas.microsoft.com/office/drawing/2014/main" id="{D64556CC-D9EC-A458-C374-D48D85F1D7CA}"/>
+              </a:ext>
+            </a:extLst>
+          </p:cNvPr>
+          <p:cNvSpPr>
+            <a:spLocks noGrp="1"/>
+          </p:cNvSpPr>
+          <p:nvPr>
+            <p:ph idx="1"/>
+          </p:nvPr>
+        </p:nvSpPr>
+        <p:spPr/>
+        <p:txBody>
+          <a:bodyPr/>
+          <a:lstStyle/>
+          <a:p>
+            <a:endParaRPr lang="en-US"/>
+          </a:p>
+        </p:txBody>
+      </p:sp>
+      <p:sp>
+        <p:nvSpPr>
+          <p:cNvPr id="4" name="Text Placeholder 3">
+            <a:extLst>
+              <a:ext uri="{FF2B5EF4-FFF2-40B4-BE49-F238E27FC236}">
+                <a16:creationId xmlns:a16="http://schemas.microsoft.com/office/drawing/2014/main" id="{59B411C9-8D31-547E-9269-1ACBB2E2B11C}"/>
+              </a:ext>
+            </a:extLst>
+          </p:cNvPr>
+          <p:cNvSpPr>
+            <a:spLocks noGrp="1"/>
+          </p:cNvSpPr>
+          <p:nvPr>
+            <p:ph type="body" sz="half" idx="2"/>
+          </p:nvPr>
+        </p:nvSpPr>
+        <p:spPr/>
+        <p:txBody>
+          <a:bodyPr/>
+          <a:lstStyle/>
+          <a:p>
+            <a:endParaRPr lang="en-US"/>
+          </a:p>
+        </p:txBody>
+      </p:sp>
+    </p:spTree>
+    <p:extLst>
+      <p:ext uri="{BB962C8B-B14F-4D97-AF65-F5344CB8AC3E}">
+        <p14:creationId xmlns:p14="http://schemas.microsoft.com/office/powerpoint/2010/main" val="706667996"/>
+      </p:ext>
+    </p:extLst>
+  </p:cSld>
+  <p:clrMapOvr>
+    <a:masterClrMapping/>
+  </p:clrMapOvr>
+</p:sld>
+</file>
+
 <file path=ppt/slides/slide2.xml><?xml version="1.0" encoding="utf-8"?>
 <p:sld xmlns:a="http://schemas.openxmlformats.org/drawingml/2006/main" xmlns:r="http://schemas.openxmlformats.org/officeDocument/2006/relationships" xmlns:p="http://schemas.openxmlformats.org/presentationml/2006/main">
   <p:cSld>
@@ -11478,10 +11911,3225 @@
           </a:p>
         </p:txBody>
       </p:sp>
+      <p:sp>
+        <p:nvSpPr>
+          <p:cNvPr id="7" name="Rectangle 6">
+            <a:extLst>
+              <a:ext uri="{FF2B5EF4-FFF2-40B4-BE49-F238E27FC236}">
+                <a16:creationId xmlns:a16="http://schemas.microsoft.com/office/drawing/2014/main" id="{BFAD0CFA-A664-B240-9DCE-4CD5027ED7EE}"/>
+              </a:ext>
+            </a:extLst>
+          </p:cNvPr>
+          <p:cNvSpPr/>
+          <p:nvPr/>
+        </p:nvSpPr>
+        <p:spPr>
+          <a:xfrm>
+            <a:off x="881707" y="5108116"/>
+            <a:ext cx="1493806" cy="1032524"/>
+          </a:xfrm>
+          <a:prstGeom prst="rect">
+            <a:avLst/>
+          </a:prstGeom>
+          <a:solidFill>
+            <a:srgbClr val="7030A0"/>
+          </a:solidFill>
+        </p:spPr>
+        <p:style>
+          <a:lnRef idx="2">
+            <a:schemeClr val="accent1">
+              <a:shade val="15000"/>
+            </a:schemeClr>
+          </a:lnRef>
+          <a:fillRef idx="1">
+            <a:schemeClr val="accent1"/>
+          </a:fillRef>
+          <a:effectRef idx="0">
+            <a:schemeClr val="accent1"/>
+          </a:effectRef>
+          <a:fontRef idx="minor">
+            <a:schemeClr val="lt1"/>
+          </a:fontRef>
+        </p:style>
+        <p:txBody>
+          <a:bodyPr rtlCol="0" anchor="ctr"/>
+          <a:lstStyle/>
+          <a:p>
+            <a:pPr algn="ctr"/>
+            <a:r>
+              <a:rPr lang="es-ES" dirty="0"/>
+              <a:t>VECTOR</a:t>
+            </a:r>
+          </a:p>
+          <a:p>
+            <a:pPr algn="ctr"/>
+            <a:r>
+              <a:rPr lang="es-ES" dirty="0"/>
+              <a:t>DATABASE * (EXTERNAL)</a:t>
+            </a:r>
+            <a:endParaRPr lang="en-US" dirty="0"/>
+          </a:p>
+        </p:txBody>
+      </p:sp>
+      <p:sp>
+        <p:nvSpPr>
+          <p:cNvPr id="9" name="Rectangle 8">
+            <a:extLst>
+              <a:ext uri="{FF2B5EF4-FFF2-40B4-BE49-F238E27FC236}">
+                <a16:creationId xmlns:a16="http://schemas.microsoft.com/office/drawing/2014/main" id="{F6D6DE86-CE9B-4647-6912-54E09961A763}"/>
+              </a:ext>
+            </a:extLst>
+          </p:cNvPr>
+          <p:cNvSpPr/>
+          <p:nvPr/>
+        </p:nvSpPr>
+        <p:spPr>
+          <a:xfrm>
+            <a:off x="1245454" y="1590019"/>
+            <a:ext cx="4862424" cy="437189"/>
+          </a:xfrm>
+          <a:prstGeom prst="rect">
+            <a:avLst/>
+          </a:prstGeom>
+        </p:spPr>
+        <p:style>
+          <a:lnRef idx="2">
+            <a:schemeClr val="accent1">
+              <a:shade val="15000"/>
+            </a:schemeClr>
+          </a:lnRef>
+          <a:fillRef idx="1">
+            <a:schemeClr val="accent1"/>
+          </a:fillRef>
+          <a:effectRef idx="0">
+            <a:schemeClr val="accent1"/>
+          </a:effectRef>
+          <a:fontRef idx="minor">
+            <a:schemeClr val="lt1"/>
+          </a:fontRef>
+        </p:style>
+        <p:txBody>
+          <a:bodyPr rtlCol="0" anchor="ctr"/>
+          <a:lstStyle/>
+          <a:p>
+            <a:pPr algn="ctr"/>
+            <a:r>
+              <a:rPr lang="es-ES" dirty="0"/>
+              <a:t>AGENT (LLM)</a:t>
+            </a:r>
+            <a:endParaRPr lang="en-US" dirty="0"/>
+          </a:p>
+        </p:txBody>
+      </p:sp>
+      <p:sp>
+        <p:nvSpPr>
+          <p:cNvPr id="10" name="Rectangle 9">
+            <a:extLst>
+              <a:ext uri="{FF2B5EF4-FFF2-40B4-BE49-F238E27FC236}">
+                <a16:creationId xmlns:a16="http://schemas.microsoft.com/office/drawing/2014/main" id="{0EE929B7-BA34-ABDC-8E07-5CFE14C177B4}"/>
+              </a:ext>
+            </a:extLst>
+          </p:cNvPr>
+          <p:cNvSpPr/>
+          <p:nvPr/>
+        </p:nvSpPr>
+        <p:spPr>
+          <a:xfrm>
+            <a:off x="4762154" y="5118341"/>
+            <a:ext cx="1626080" cy="1003370"/>
+          </a:xfrm>
+          <a:prstGeom prst="rect">
+            <a:avLst/>
+          </a:prstGeom>
+          <a:solidFill>
+            <a:srgbClr val="7030A0"/>
+          </a:solidFill>
+        </p:spPr>
+        <p:style>
+          <a:lnRef idx="2">
+            <a:schemeClr val="accent1">
+              <a:shade val="15000"/>
+            </a:schemeClr>
+          </a:lnRef>
+          <a:fillRef idx="1">
+            <a:schemeClr val="accent1"/>
+          </a:fillRef>
+          <a:effectRef idx="0">
+            <a:schemeClr val="accent1"/>
+          </a:effectRef>
+          <a:fontRef idx="minor">
+            <a:schemeClr val="lt1"/>
+          </a:fontRef>
+        </p:style>
+        <p:txBody>
+          <a:bodyPr rtlCol="0" anchor="ctr"/>
+          <a:lstStyle/>
+          <a:p>
+            <a:pPr algn="ctr"/>
+            <a:r>
+              <a:rPr lang="es-ES" dirty="0"/>
+              <a:t>STRUCTURED</a:t>
+            </a:r>
+          </a:p>
+          <a:p>
+            <a:pPr algn="ctr"/>
+            <a:r>
+              <a:rPr lang="es-ES" dirty="0"/>
+              <a:t>DATABASE (EXTERNAL)</a:t>
+            </a:r>
+            <a:endParaRPr lang="en-US" dirty="0"/>
+          </a:p>
+        </p:txBody>
+      </p:sp>
+      <mc:AlternateContent xmlns:mc="http://schemas.openxmlformats.org/markup-compatibility/2006">
+        <mc:Choice xmlns:a14="http://schemas.microsoft.com/office/drawing/2010/main" Requires="a14">
+          <p:sp>
+            <p:nvSpPr>
+              <p:cNvPr id="12" name="TextBox 11">
+                <a:extLst>
+                  <a:ext uri="{FF2B5EF4-FFF2-40B4-BE49-F238E27FC236}">
+                    <a16:creationId xmlns:a16="http://schemas.microsoft.com/office/drawing/2014/main" id="{B88A100E-BB6F-E6A3-7A89-DB0C76426E81}"/>
+                  </a:ext>
+                </a:extLst>
+              </p:cNvPr>
+              <p:cNvSpPr txBox="1"/>
+              <p:nvPr/>
+            </p:nvSpPr>
+            <p:spPr>
+              <a:xfrm>
+                <a:off x="417319" y="2712922"/>
+                <a:ext cx="2454528" cy="461665"/>
+              </a:xfrm>
+              <a:prstGeom prst="rect">
+                <a:avLst/>
+              </a:prstGeom>
+              <a:solidFill>
+                <a:schemeClr val="accent1">
+                  <a:lumMod val="20000"/>
+                  <a:lumOff val="80000"/>
+                </a:schemeClr>
+              </a:solidFill>
+            </p:spPr>
+            <p:txBody>
+              <a:bodyPr wrap="square">
+                <a:spAutoFit/>
+              </a:bodyPr>
+              <a:lstStyle/>
+              <a:p>
+                <a:pPr algn="ctr"/>
+                <a14:m>
+                  <m:oMath xmlns:m="http://schemas.openxmlformats.org/officeDocument/2006/math">
+                    <m:r>
+                      <m:rPr>
+                        <m:nor/>
+                      </m:rPr>
+                      <a:rPr lang="es-ES" sz="1200" b="0" i="0" smtClean="0">
+                        <a:latin typeface="Cambria Math" panose="02040503050406030204" pitchFamily="18" charset="0"/>
+                      </a:rPr>
+                      <m:t>query</m:t>
+                    </m:r>
+                    <m:r>
+                      <m:rPr>
+                        <m:nor/>
+                      </m:rPr>
+                      <a:rPr lang="es-ES" sz="1200" b="0" i="0" smtClean="0">
+                        <a:latin typeface="Cambria Math" panose="02040503050406030204" pitchFamily="18" charset="0"/>
+                      </a:rPr>
+                      <m:t> (</m:t>
+                    </m:r>
+                    <m:r>
+                      <m:rPr>
+                        <m:nor/>
+                      </m:rPr>
+                      <a:rPr lang="es-ES" sz="1200" b="0" i="0" smtClean="0">
+                        <a:latin typeface="Cambria Math" panose="02040503050406030204" pitchFamily="18" charset="0"/>
+                      </a:rPr>
+                      <m:t>LLM</m:t>
+                    </m:r>
+                    <m:r>
+                      <m:rPr>
+                        <m:nor/>
+                      </m:rPr>
+                      <a:rPr lang="es-ES" sz="1200" b="0" i="0" smtClean="0">
+                        <a:latin typeface="Cambria Math" panose="02040503050406030204" pitchFamily="18" charset="0"/>
+                      </a:rPr>
+                      <m:t> </m:t>
+                    </m:r>
+                    <m:r>
+                      <m:rPr>
+                        <m:nor/>
+                      </m:rPr>
+                      <a:rPr lang="es-ES" sz="1200" b="0" i="0" smtClean="0">
+                        <a:latin typeface="Cambria Math" panose="02040503050406030204" pitchFamily="18" charset="0"/>
+                      </a:rPr>
+                      <m:t>generated</m:t>
+                    </m:r>
+                    <m:r>
+                      <m:rPr>
+                        <m:nor/>
+                      </m:rPr>
+                      <a:rPr lang="es-ES" sz="1200" b="0" i="0" smtClean="0">
+                        <a:latin typeface="Cambria Math" panose="02040503050406030204" pitchFamily="18" charset="0"/>
+                      </a:rPr>
+                      <m:t>)</m:t>
+                    </m:r>
+                  </m:oMath>
+                </a14:m>
+                <a:r>
+                  <a:rPr lang="en-US" sz="1200" dirty="0"/>
+                  <a:t>: </a:t>
+                </a:r>
+              </a:p>
+              <a:p>
+                <a:pPr algn="ctr"/>
+                <a:r>
+                  <a:rPr lang="en-US" sz="1200" dirty="0"/>
+                  <a:t>“What is the user’s favorite food?”</a:t>
+                </a:r>
+              </a:p>
+            </p:txBody>
+          </p:sp>
+        </mc:Choice>
+        <mc:Fallback>
+          <p:sp>
+            <p:nvSpPr>
+              <p:cNvPr id="12" name="TextBox 11">
+                <a:extLst>
+                  <a:ext uri="{FF2B5EF4-FFF2-40B4-BE49-F238E27FC236}">
+                    <a16:creationId xmlns:a16="http://schemas.microsoft.com/office/drawing/2014/main" id="{B88A100E-BB6F-E6A3-7A89-DB0C76426E81}"/>
+                  </a:ext>
+                </a:extLst>
+              </p:cNvPr>
+              <p:cNvSpPr txBox="1">
+                <a:spLocks noRot="1" noChangeAspect="1" noMove="1" noResize="1" noEditPoints="1" noAdjustHandles="1" noChangeArrowheads="1" noChangeShapeType="1" noTextEdit="1"/>
+              </p:cNvSpPr>
+              <p:nvPr/>
+            </p:nvSpPr>
+            <p:spPr>
+              <a:xfrm>
+                <a:off x="417319" y="2712922"/>
+                <a:ext cx="2454528" cy="461665"/>
+              </a:xfrm>
+              <a:prstGeom prst="rect">
+                <a:avLst/>
+              </a:prstGeom>
+              <a:blipFill>
+                <a:blip r:embed="rId2"/>
+                <a:stretch>
+                  <a:fillRect b="-9211"/>
+                </a:stretch>
+              </a:blipFill>
+            </p:spPr>
+            <p:txBody>
+              <a:bodyPr/>
+              <a:lstStyle/>
+              <a:p>
+                <a:r>
+                  <a:rPr lang="en-US">
+                    <a:noFill/>
+                  </a:rPr>
+                  <a:t> </a:t>
+                </a:r>
+              </a:p>
+            </p:txBody>
+          </p:sp>
+        </mc:Fallback>
+      </mc:AlternateContent>
+      <mc:AlternateContent xmlns:mc="http://schemas.openxmlformats.org/markup-compatibility/2006">
+        <mc:Choice xmlns:a14="http://schemas.microsoft.com/office/drawing/2010/main" Requires="a14">
+          <p:sp>
+            <p:nvSpPr>
+              <p:cNvPr id="13" name="TextBox 12">
+                <a:extLst>
+                  <a:ext uri="{FF2B5EF4-FFF2-40B4-BE49-F238E27FC236}">
+                    <a16:creationId xmlns:a16="http://schemas.microsoft.com/office/drawing/2014/main" id="{24BE66D6-07A0-9586-003D-B363847877F2}"/>
+                  </a:ext>
+                </a:extLst>
+              </p:cNvPr>
+              <p:cNvSpPr txBox="1"/>
+              <p:nvPr/>
+            </p:nvSpPr>
+            <p:spPr>
+              <a:xfrm>
+                <a:off x="4551843" y="2593389"/>
+                <a:ext cx="2046702" cy="830997"/>
+              </a:xfrm>
+              <a:prstGeom prst="rect">
+                <a:avLst/>
+              </a:prstGeom>
+              <a:solidFill>
+                <a:schemeClr val="accent1">
+                  <a:lumMod val="20000"/>
+                  <a:lumOff val="80000"/>
+                </a:schemeClr>
+              </a:solidFill>
+            </p:spPr>
+            <p:txBody>
+              <a:bodyPr wrap="square">
+                <a:spAutoFit/>
+              </a:bodyPr>
+              <a:lstStyle/>
+              <a:p>
+                <a:pPr algn="ctr"/>
+                <a14:m>
+                  <m:oMath xmlns:m="http://schemas.openxmlformats.org/officeDocument/2006/math">
+                    <m:r>
+                      <m:rPr>
+                        <m:nor/>
+                      </m:rPr>
+                      <a:rPr lang="es-ES" sz="1200" i="0" smtClean="0">
+                        <a:latin typeface="Cambria Math" panose="02040503050406030204" pitchFamily="18" charset="0"/>
+                      </a:rPr>
+                      <m:t>q</m:t>
+                    </m:r>
+                    <m:r>
+                      <m:rPr>
+                        <m:nor/>
+                      </m:rPr>
+                      <a:rPr lang="es-ES" sz="1200" b="0" i="0" smtClean="0">
+                        <a:latin typeface="Cambria Math" panose="02040503050406030204" pitchFamily="18" charset="0"/>
+                      </a:rPr>
+                      <m:t>uery</m:t>
+                    </m:r>
+                    <m:r>
+                      <m:rPr>
+                        <m:nor/>
+                      </m:rPr>
+                      <a:rPr lang="es-ES" sz="1200" b="0" i="0" smtClean="0">
+                        <a:latin typeface="Cambria Math" panose="02040503050406030204" pitchFamily="18" charset="0"/>
+                      </a:rPr>
+                      <m:t> (</m:t>
+                    </m:r>
+                    <m:r>
+                      <m:rPr>
+                        <m:nor/>
+                      </m:rPr>
+                      <a:rPr lang="es-ES" sz="1200" b="0" i="0" smtClean="0">
+                        <a:latin typeface="Cambria Math" panose="02040503050406030204" pitchFamily="18" charset="0"/>
+                      </a:rPr>
+                      <m:t>LLM</m:t>
+                    </m:r>
+                    <m:r>
+                      <m:rPr>
+                        <m:nor/>
+                      </m:rPr>
+                      <a:rPr lang="es-ES" sz="1200" b="0" i="0" smtClean="0">
+                        <a:latin typeface="Cambria Math" panose="02040503050406030204" pitchFamily="18" charset="0"/>
+                      </a:rPr>
+                      <m:t> </m:t>
+                    </m:r>
+                    <m:r>
+                      <m:rPr>
+                        <m:nor/>
+                      </m:rPr>
+                      <a:rPr lang="es-ES" sz="1200" b="0" i="0" smtClean="0">
+                        <a:latin typeface="Cambria Math" panose="02040503050406030204" pitchFamily="18" charset="0"/>
+                      </a:rPr>
+                      <m:t>generated</m:t>
+                    </m:r>
+                    <m:r>
+                      <m:rPr>
+                        <m:nor/>
+                      </m:rPr>
+                      <a:rPr lang="es-ES" sz="1200" b="0" i="0" smtClean="0">
+                        <a:latin typeface="Cambria Math" panose="02040503050406030204" pitchFamily="18" charset="0"/>
+                      </a:rPr>
+                      <m:t>)</m:t>
+                    </m:r>
+                  </m:oMath>
+                </a14:m>
+                <a:r>
+                  <a:rPr lang="en-US" sz="1200" dirty="0"/>
+                  <a:t>: </a:t>
+                </a:r>
+              </a:p>
+              <a:p>
+                <a:pPr algn="ctr"/>
+                <a:r>
+                  <a:rPr lang="en-US" sz="1200" dirty="0"/>
+                  <a:t>SELECT * FROM database WHERE content like ‘%food%’ OR … ORDER BY … LIMIT 1;</a:t>
+                </a:r>
+              </a:p>
+            </p:txBody>
+          </p:sp>
+        </mc:Choice>
+        <mc:Fallback>
+          <p:sp>
+            <p:nvSpPr>
+              <p:cNvPr id="13" name="TextBox 12">
+                <a:extLst>
+                  <a:ext uri="{FF2B5EF4-FFF2-40B4-BE49-F238E27FC236}">
+                    <a16:creationId xmlns:a16="http://schemas.microsoft.com/office/drawing/2014/main" id="{24BE66D6-07A0-9586-003D-B363847877F2}"/>
+                  </a:ext>
+                </a:extLst>
+              </p:cNvPr>
+              <p:cNvSpPr txBox="1">
+                <a:spLocks noRot="1" noChangeAspect="1" noMove="1" noResize="1" noEditPoints="1" noAdjustHandles="1" noChangeArrowheads="1" noChangeShapeType="1" noTextEdit="1"/>
+              </p:cNvSpPr>
+              <p:nvPr/>
+            </p:nvSpPr>
+            <p:spPr>
+              <a:xfrm>
+                <a:off x="4551843" y="2593389"/>
+                <a:ext cx="2046702" cy="830997"/>
+              </a:xfrm>
+              <a:prstGeom prst="rect">
+                <a:avLst/>
+              </a:prstGeom>
+              <a:blipFill>
+                <a:blip r:embed="rId3"/>
+                <a:stretch>
+                  <a:fillRect r="-896" b="-4380"/>
+                </a:stretch>
+              </a:blipFill>
+            </p:spPr>
+            <p:txBody>
+              <a:bodyPr/>
+              <a:lstStyle/>
+              <a:p>
+                <a:r>
+                  <a:rPr lang="en-US">
+                    <a:noFill/>
+                  </a:rPr>
+                  <a:t> </a:t>
+                </a:r>
+              </a:p>
+            </p:txBody>
+          </p:sp>
+        </mc:Fallback>
+      </mc:AlternateContent>
+      <mc:AlternateContent xmlns:mc="http://schemas.openxmlformats.org/markup-compatibility/2006">
+        <mc:Choice xmlns:a14="http://schemas.microsoft.com/office/drawing/2010/main" Requires="a14">
+          <p:sp>
+            <p:nvSpPr>
+              <p:cNvPr id="14" name="TextBox 13">
+                <a:extLst>
+                  <a:ext uri="{FF2B5EF4-FFF2-40B4-BE49-F238E27FC236}">
+                    <a16:creationId xmlns:a16="http://schemas.microsoft.com/office/drawing/2014/main" id="{520B8622-A4A0-0F7F-26A6-6AD7652B37A5}"/>
+                  </a:ext>
+                </a:extLst>
+              </p:cNvPr>
+              <p:cNvSpPr txBox="1"/>
+              <p:nvPr/>
+            </p:nvSpPr>
+            <p:spPr>
+              <a:xfrm>
+                <a:off x="613972" y="3599317"/>
+                <a:ext cx="2039344" cy="461665"/>
+              </a:xfrm>
+              <a:prstGeom prst="rect">
+                <a:avLst/>
+              </a:prstGeom>
+              <a:solidFill>
+                <a:schemeClr val="bg1">
+                  <a:lumMod val="95000"/>
+                </a:schemeClr>
+              </a:solidFill>
+            </p:spPr>
+            <p:txBody>
+              <a:bodyPr wrap="square">
+                <a:spAutoFit/>
+              </a:bodyPr>
+              <a:lstStyle/>
+              <a:p>
+                <a:pPr algn="ctr"/>
+                <a14:m>
+                  <m:oMath xmlns:m="http://schemas.openxmlformats.org/officeDocument/2006/math">
+                    <m:r>
+                      <m:rPr>
+                        <m:nor/>
+                      </m:rPr>
+                      <a:rPr lang="es-ES" sz="1200" b="0" i="0" smtClean="0">
+                        <a:latin typeface="Cambria Math" panose="02040503050406030204" pitchFamily="18" charset="0"/>
+                      </a:rPr>
+                      <m:t>embedding</m:t>
+                    </m:r>
+                    <m:r>
+                      <m:rPr>
+                        <m:nor/>
+                      </m:rPr>
+                      <a:rPr lang="es-ES" sz="1200" b="0" i="0" smtClean="0">
+                        <a:latin typeface="Cambria Math" panose="02040503050406030204" pitchFamily="18" charset="0"/>
+                      </a:rPr>
+                      <m:t> </m:t>
+                    </m:r>
+                    <m:r>
+                      <m:rPr>
+                        <m:nor/>
+                      </m:rPr>
+                      <a:rPr lang="es-ES" sz="1200" b="0" i="0" smtClean="0">
+                        <a:latin typeface="Cambria Math" panose="02040503050406030204" pitchFamily="18" charset="0"/>
+                      </a:rPr>
+                      <m:t>of</m:t>
+                    </m:r>
+                    <m:r>
+                      <m:rPr>
+                        <m:nor/>
+                      </m:rPr>
+                      <a:rPr lang="es-ES" sz="1200" b="0" i="0" smtClean="0">
+                        <a:latin typeface="Cambria Math" panose="02040503050406030204" pitchFamily="18" charset="0"/>
+                      </a:rPr>
+                      <m:t> </m:t>
+                    </m:r>
+                    <m:r>
+                      <m:rPr>
+                        <m:nor/>
+                      </m:rPr>
+                      <a:rPr lang="es-ES" sz="1200" b="0" i="0" smtClean="0">
+                        <a:latin typeface="Cambria Math" panose="02040503050406030204" pitchFamily="18" charset="0"/>
+                      </a:rPr>
+                      <m:t>query</m:t>
+                    </m:r>
+                  </m:oMath>
+                </a14:m>
+                <a:r>
+                  <a:rPr lang="en-US" sz="1200" dirty="0"/>
+                  <a:t>: </a:t>
+                </a:r>
+              </a:p>
+              <a:p>
+                <a:pPr algn="ctr"/>
+                <a:r>
+                  <a:rPr lang="en-US" sz="1200" dirty="0"/>
+                  <a:t>[0.12,0.52,…]</a:t>
+                </a:r>
+              </a:p>
+            </p:txBody>
+          </p:sp>
+        </mc:Choice>
+        <mc:Fallback>
+          <p:sp>
+            <p:nvSpPr>
+              <p:cNvPr id="14" name="TextBox 13">
+                <a:extLst>
+                  <a:ext uri="{FF2B5EF4-FFF2-40B4-BE49-F238E27FC236}">
+                    <a16:creationId xmlns:a16="http://schemas.microsoft.com/office/drawing/2014/main" id="{520B8622-A4A0-0F7F-26A6-6AD7652B37A5}"/>
+                  </a:ext>
+                </a:extLst>
+              </p:cNvPr>
+              <p:cNvSpPr txBox="1">
+                <a:spLocks noRot="1" noChangeAspect="1" noMove="1" noResize="1" noEditPoints="1" noAdjustHandles="1" noChangeArrowheads="1" noChangeShapeType="1" noTextEdit="1"/>
+              </p:cNvSpPr>
+              <p:nvPr/>
+            </p:nvSpPr>
+            <p:spPr>
+              <a:xfrm>
+                <a:off x="613972" y="3599317"/>
+                <a:ext cx="2039344" cy="461665"/>
+              </a:xfrm>
+              <a:prstGeom prst="rect">
+                <a:avLst/>
+              </a:prstGeom>
+              <a:blipFill>
+                <a:blip r:embed="rId4"/>
+                <a:stretch>
+                  <a:fillRect b="-9211"/>
+                </a:stretch>
+              </a:blipFill>
+            </p:spPr>
+            <p:txBody>
+              <a:bodyPr/>
+              <a:lstStyle/>
+              <a:p>
+                <a:r>
+                  <a:rPr lang="en-US">
+                    <a:noFill/>
+                  </a:rPr>
+                  <a:t> </a:t>
+                </a:r>
+              </a:p>
+            </p:txBody>
+          </p:sp>
+        </mc:Fallback>
+      </mc:AlternateContent>
+      <mc:AlternateContent xmlns:mc="http://schemas.openxmlformats.org/markup-compatibility/2006">
+        <mc:Choice xmlns:a14="http://schemas.microsoft.com/office/drawing/2010/main" Requires="a14">
+          <p:sp>
+            <p:nvSpPr>
+              <p:cNvPr id="15" name="TextBox 14">
+                <a:extLst>
+                  <a:ext uri="{FF2B5EF4-FFF2-40B4-BE49-F238E27FC236}">
+                    <a16:creationId xmlns:a16="http://schemas.microsoft.com/office/drawing/2014/main" id="{E28186F2-0138-D1AD-6208-993E2B5E1BC7}"/>
+                  </a:ext>
+                </a:extLst>
+              </p:cNvPr>
+              <p:cNvSpPr txBox="1"/>
+              <p:nvPr/>
+            </p:nvSpPr>
+            <p:spPr>
+              <a:xfrm>
+                <a:off x="3008121" y="4520069"/>
+                <a:ext cx="1337090" cy="461665"/>
+              </a:xfrm>
+              <a:prstGeom prst="rect">
+                <a:avLst/>
+              </a:prstGeom>
+              <a:solidFill>
+                <a:srgbClr val="CCCCFF"/>
+              </a:solidFill>
+            </p:spPr>
+            <p:txBody>
+              <a:bodyPr wrap="square">
+                <a:spAutoFit/>
+              </a:bodyPr>
+              <a:lstStyle/>
+              <a:p>
+                <a:pPr algn="ctr"/>
+                <a14:m>
+                  <m:oMath xmlns:m="http://schemas.openxmlformats.org/officeDocument/2006/math">
+                    <m:r>
+                      <m:rPr>
+                        <m:nor/>
+                      </m:rPr>
+                      <a:rPr lang="es-ES" sz="1200" b="0" i="0" smtClean="0">
+                        <a:latin typeface="Cambria Math" panose="02040503050406030204" pitchFamily="18" charset="0"/>
+                      </a:rPr>
+                      <m:t>top</m:t>
+                    </m:r>
+                    <m:r>
+                      <m:rPr>
+                        <m:nor/>
+                      </m:rPr>
+                      <a:rPr lang="es-ES" sz="1200" b="0" i="0" smtClean="0">
+                        <a:latin typeface="Cambria Math" panose="02040503050406030204" pitchFamily="18" charset="0"/>
+                      </a:rPr>
+                      <m:t> </m:t>
+                    </m:r>
+                    <m:r>
+                      <m:rPr>
+                        <m:nor/>
+                      </m:rPr>
+                      <a:rPr lang="es-ES" sz="1200" b="0" i="0" smtClean="0">
+                        <a:latin typeface="Cambria Math" panose="02040503050406030204" pitchFamily="18" charset="0"/>
+                      </a:rPr>
+                      <m:t>memory</m:t>
+                    </m:r>
+                    <m:r>
+                      <m:rPr>
+                        <m:nor/>
+                      </m:rPr>
+                      <a:rPr lang="es-ES" sz="1200" b="0" i="0" smtClean="0">
+                        <a:latin typeface="Cambria Math" panose="02040503050406030204" pitchFamily="18" charset="0"/>
+                      </a:rPr>
+                      <m:t>/</m:t>
+                    </m:r>
+                    <m:r>
+                      <m:rPr>
+                        <m:nor/>
+                      </m:rPr>
+                      <a:rPr lang="es-ES" sz="1200" b="0" i="0" smtClean="0">
+                        <a:latin typeface="Cambria Math" panose="02040503050406030204" pitchFamily="18" charset="0"/>
+                      </a:rPr>
+                      <m:t>s</m:t>
+                    </m:r>
+                  </m:oMath>
+                </a14:m>
+                <a:r>
+                  <a:rPr lang="en-US" sz="1200" dirty="0"/>
+                  <a:t>: </a:t>
+                </a:r>
+              </a:p>
+              <a:p>
+                <a:pPr algn="ctr"/>
+                <a:r>
+                  <a:rPr lang="en-US" sz="1200" dirty="0"/>
+                  <a:t>“User loves pizza”</a:t>
+                </a:r>
+              </a:p>
+            </p:txBody>
+          </p:sp>
+        </mc:Choice>
+        <mc:Fallback>
+          <p:sp>
+            <p:nvSpPr>
+              <p:cNvPr id="15" name="TextBox 14">
+                <a:extLst>
+                  <a:ext uri="{FF2B5EF4-FFF2-40B4-BE49-F238E27FC236}">
+                    <a16:creationId xmlns:a16="http://schemas.microsoft.com/office/drawing/2014/main" id="{E28186F2-0138-D1AD-6208-993E2B5E1BC7}"/>
+                  </a:ext>
+                </a:extLst>
+              </p:cNvPr>
+              <p:cNvSpPr txBox="1">
+                <a:spLocks noRot="1" noChangeAspect="1" noMove="1" noResize="1" noEditPoints="1" noAdjustHandles="1" noChangeArrowheads="1" noChangeShapeType="1" noTextEdit="1"/>
+              </p:cNvSpPr>
+              <p:nvPr/>
+            </p:nvSpPr>
+            <p:spPr>
+              <a:xfrm>
+                <a:off x="3008121" y="4520069"/>
+                <a:ext cx="1337090" cy="461665"/>
+              </a:xfrm>
+              <a:prstGeom prst="rect">
+                <a:avLst/>
+              </a:prstGeom>
+              <a:blipFill>
+                <a:blip r:embed="rId5"/>
+                <a:stretch>
+                  <a:fillRect b="-9211"/>
+                </a:stretch>
+              </a:blipFill>
+            </p:spPr>
+            <p:txBody>
+              <a:bodyPr/>
+              <a:lstStyle/>
+              <a:p>
+                <a:r>
+                  <a:rPr lang="en-US">
+                    <a:noFill/>
+                  </a:rPr>
+                  <a:t> </a:t>
+                </a:r>
+              </a:p>
+            </p:txBody>
+          </p:sp>
+        </mc:Fallback>
+      </mc:AlternateContent>
+      <p:cxnSp>
+        <p:nvCxnSpPr>
+          <p:cNvPr id="17" name="Straight Arrow Connector 16">
+            <a:extLst>
+              <a:ext uri="{FF2B5EF4-FFF2-40B4-BE49-F238E27FC236}">
+                <a16:creationId xmlns:a16="http://schemas.microsoft.com/office/drawing/2014/main" id="{6044D633-94CC-C7C2-F7F9-A32FE14EEED7}"/>
+              </a:ext>
+            </a:extLst>
+          </p:cNvPr>
+          <p:cNvCxnSpPr>
+            <a:cxnSpLocks/>
+            <a:stCxn id="14" idx="2"/>
+            <a:endCxn id="7" idx="0"/>
+          </p:cNvCxnSpPr>
+          <p:nvPr/>
+        </p:nvCxnSpPr>
+        <p:spPr>
+          <a:xfrm flipH="1">
+            <a:off x="1628610" y="4060982"/>
+            <a:ext cx="5034" cy="1047134"/>
+          </a:xfrm>
+          <a:prstGeom prst="straightConnector1">
+            <a:avLst/>
+          </a:prstGeom>
+          <a:ln>
+            <a:tailEnd type="triangle"/>
+          </a:ln>
+        </p:spPr>
+        <p:style>
+          <a:lnRef idx="1">
+            <a:schemeClr val="accent1"/>
+          </a:lnRef>
+          <a:fillRef idx="0">
+            <a:schemeClr val="accent1"/>
+          </a:fillRef>
+          <a:effectRef idx="0">
+            <a:schemeClr val="accent1"/>
+          </a:effectRef>
+          <a:fontRef idx="minor">
+            <a:schemeClr val="tx1"/>
+          </a:fontRef>
+        </p:style>
+      </p:cxnSp>
+      <p:cxnSp>
+        <p:nvCxnSpPr>
+          <p:cNvPr id="22" name="Straight Arrow Connector 21">
+            <a:extLst>
+              <a:ext uri="{FF2B5EF4-FFF2-40B4-BE49-F238E27FC236}">
+                <a16:creationId xmlns:a16="http://schemas.microsoft.com/office/drawing/2014/main" id="{149A157C-2185-420B-D69C-3D9667E2E079}"/>
+              </a:ext>
+            </a:extLst>
+          </p:cNvPr>
+          <p:cNvCxnSpPr>
+            <a:cxnSpLocks/>
+            <a:endCxn id="12" idx="0"/>
+          </p:cNvCxnSpPr>
+          <p:nvPr/>
+        </p:nvCxnSpPr>
+        <p:spPr>
+          <a:xfrm>
+            <a:off x="1644583" y="2351630"/>
+            <a:ext cx="0" cy="361292"/>
+          </a:xfrm>
+          <a:prstGeom prst="straightConnector1">
+            <a:avLst/>
+          </a:prstGeom>
+          <a:ln>
+            <a:tailEnd type="triangle"/>
+          </a:ln>
+        </p:spPr>
+        <p:style>
+          <a:lnRef idx="1">
+            <a:schemeClr val="accent1"/>
+          </a:lnRef>
+          <a:fillRef idx="0">
+            <a:schemeClr val="accent1"/>
+          </a:fillRef>
+          <a:effectRef idx="0">
+            <a:schemeClr val="accent1"/>
+          </a:effectRef>
+          <a:fontRef idx="minor">
+            <a:schemeClr val="tx1"/>
+          </a:fontRef>
+        </p:style>
+      </p:cxnSp>
+      <p:cxnSp>
+        <p:nvCxnSpPr>
+          <p:cNvPr id="25" name="Straight Arrow Connector 24">
+            <a:extLst>
+              <a:ext uri="{FF2B5EF4-FFF2-40B4-BE49-F238E27FC236}">
+                <a16:creationId xmlns:a16="http://schemas.microsoft.com/office/drawing/2014/main" id="{9FBF4257-C33A-F543-FC02-EE45817DE6C9}"/>
+              </a:ext>
+            </a:extLst>
+          </p:cNvPr>
+          <p:cNvCxnSpPr>
+            <a:cxnSpLocks/>
+            <a:stCxn id="12" idx="2"/>
+            <a:endCxn id="14" idx="0"/>
+          </p:cNvCxnSpPr>
+          <p:nvPr/>
+        </p:nvCxnSpPr>
+        <p:spPr>
+          <a:xfrm flipH="1">
+            <a:off x="1633644" y="3174587"/>
+            <a:ext cx="10939" cy="424730"/>
+          </a:xfrm>
+          <a:prstGeom prst="straightConnector1">
+            <a:avLst/>
+          </a:prstGeom>
+          <a:ln>
+            <a:tailEnd type="triangle"/>
+          </a:ln>
+        </p:spPr>
+        <p:style>
+          <a:lnRef idx="1">
+            <a:schemeClr val="accent1"/>
+          </a:lnRef>
+          <a:fillRef idx="0">
+            <a:schemeClr val="accent1"/>
+          </a:fillRef>
+          <a:effectRef idx="0">
+            <a:schemeClr val="accent1"/>
+          </a:effectRef>
+          <a:fontRef idx="minor">
+            <a:schemeClr val="tx1"/>
+          </a:fontRef>
+        </p:style>
+      </p:cxnSp>
+      <p:cxnSp>
+        <p:nvCxnSpPr>
+          <p:cNvPr id="29" name="Straight Arrow Connector 28">
+            <a:extLst>
+              <a:ext uri="{FF2B5EF4-FFF2-40B4-BE49-F238E27FC236}">
+                <a16:creationId xmlns:a16="http://schemas.microsoft.com/office/drawing/2014/main" id="{07450C19-EAE5-C71F-AD83-6436874A206F}"/>
+              </a:ext>
+            </a:extLst>
+          </p:cNvPr>
+          <p:cNvCxnSpPr>
+            <a:cxnSpLocks/>
+            <a:endCxn id="13" idx="0"/>
+          </p:cNvCxnSpPr>
+          <p:nvPr/>
+        </p:nvCxnSpPr>
+        <p:spPr>
+          <a:xfrm>
+            <a:off x="5575194" y="2310298"/>
+            <a:ext cx="0" cy="283091"/>
+          </a:xfrm>
+          <a:prstGeom prst="straightConnector1">
+            <a:avLst/>
+          </a:prstGeom>
+          <a:ln>
+            <a:tailEnd type="triangle"/>
+          </a:ln>
+        </p:spPr>
+        <p:style>
+          <a:lnRef idx="1">
+            <a:schemeClr val="accent1"/>
+          </a:lnRef>
+          <a:fillRef idx="0">
+            <a:schemeClr val="accent1"/>
+          </a:fillRef>
+          <a:effectRef idx="0">
+            <a:schemeClr val="accent1"/>
+          </a:effectRef>
+          <a:fontRef idx="minor">
+            <a:schemeClr val="tx1"/>
+          </a:fontRef>
+        </p:style>
+      </p:cxnSp>
+      <p:cxnSp>
+        <p:nvCxnSpPr>
+          <p:cNvPr id="35" name="Straight Arrow Connector 34">
+            <a:extLst>
+              <a:ext uri="{FF2B5EF4-FFF2-40B4-BE49-F238E27FC236}">
+                <a16:creationId xmlns:a16="http://schemas.microsoft.com/office/drawing/2014/main" id="{4239DB04-2188-7381-ABF3-D565A4B01E64}"/>
+              </a:ext>
+            </a:extLst>
+          </p:cNvPr>
+          <p:cNvCxnSpPr>
+            <a:cxnSpLocks/>
+            <a:stCxn id="13" idx="2"/>
+            <a:endCxn id="10" idx="0"/>
+          </p:cNvCxnSpPr>
+          <p:nvPr/>
+        </p:nvCxnSpPr>
+        <p:spPr>
+          <a:xfrm>
+            <a:off x="5575194" y="3424386"/>
+            <a:ext cx="0" cy="1693955"/>
+          </a:xfrm>
+          <a:prstGeom prst="straightConnector1">
+            <a:avLst/>
+          </a:prstGeom>
+          <a:ln>
+            <a:tailEnd type="triangle"/>
+          </a:ln>
+        </p:spPr>
+        <p:style>
+          <a:lnRef idx="1">
+            <a:schemeClr val="accent1"/>
+          </a:lnRef>
+          <a:fillRef idx="0">
+            <a:schemeClr val="accent1"/>
+          </a:fillRef>
+          <a:effectRef idx="0">
+            <a:schemeClr val="accent1"/>
+          </a:effectRef>
+          <a:fontRef idx="minor">
+            <a:schemeClr val="tx1"/>
+          </a:fontRef>
+        </p:style>
+      </p:cxnSp>
+      <p:cxnSp>
+        <p:nvCxnSpPr>
+          <p:cNvPr id="39" name="Straight Arrow Connector 38">
+            <a:extLst>
+              <a:ext uri="{FF2B5EF4-FFF2-40B4-BE49-F238E27FC236}">
+                <a16:creationId xmlns:a16="http://schemas.microsoft.com/office/drawing/2014/main" id="{88A26C07-06E5-8581-4FF3-D55890305285}"/>
+              </a:ext>
+            </a:extLst>
+          </p:cNvPr>
+          <p:cNvCxnSpPr>
+            <a:cxnSpLocks/>
+            <a:stCxn id="7" idx="3"/>
+            <a:endCxn id="15" idx="2"/>
+          </p:cNvCxnSpPr>
+          <p:nvPr/>
+        </p:nvCxnSpPr>
+        <p:spPr>
+          <a:xfrm flipV="1">
+            <a:off x="2375513" y="4981734"/>
+            <a:ext cx="1301153" cy="642644"/>
+          </a:xfrm>
+          <a:prstGeom prst="bentConnector2">
+            <a:avLst/>
+          </a:prstGeom>
+          <a:ln>
+            <a:solidFill>
+              <a:srgbClr val="7030A0"/>
+            </a:solidFill>
+            <a:tailEnd type="triangle"/>
+          </a:ln>
+        </p:spPr>
+        <p:style>
+          <a:lnRef idx="1">
+            <a:schemeClr val="accent1"/>
+          </a:lnRef>
+          <a:fillRef idx="0">
+            <a:schemeClr val="accent1"/>
+          </a:fillRef>
+          <a:effectRef idx="0">
+            <a:schemeClr val="accent1"/>
+          </a:effectRef>
+          <a:fontRef idx="minor">
+            <a:schemeClr val="tx1"/>
+          </a:fontRef>
+        </p:style>
+      </p:cxnSp>
+      <p:cxnSp>
+        <p:nvCxnSpPr>
+          <p:cNvPr id="42" name="Straight Arrow Connector 41">
+            <a:extLst>
+              <a:ext uri="{FF2B5EF4-FFF2-40B4-BE49-F238E27FC236}">
+                <a16:creationId xmlns:a16="http://schemas.microsoft.com/office/drawing/2014/main" id="{07C18EE3-900C-5FF3-5FF0-799DC497E6CA}"/>
+              </a:ext>
+            </a:extLst>
+          </p:cNvPr>
+          <p:cNvCxnSpPr>
+            <a:cxnSpLocks/>
+            <a:stCxn id="10" idx="1"/>
+            <a:endCxn id="15" idx="2"/>
+          </p:cNvCxnSpPr>
+          <p:nvPr/>
+        </p:nvCxnSpPr>
+        <p:spPr>
+          <a:xfrm rot="10800000">
+            <a:off x="3676666" y="4981734"/>
+            <a:ext cx="1085488" cy="638292"/>
+          </a:xfrm>
+          <a:prstGeom prst="bentConnector2">
+            <a:avLst/>
+          </a:prstGeom>
+          <a:ln>
+            <a:solidFill>
+              <a:srgbClr val="7030A0"/>
+            </a:solidFill>
+            <a:tailEnd type="triangle"/>
+          </a:ln>
+        </p:spPr>
+        <p:style>
+          <a:lnRef idx="1">
+            <a:schemeClr val="accent1"/>
+          </a:lnRef>
+          <a:fillRef idx="0">
+            <a:schemeClr val="accent1"/>
+          </a:fillRef>
+          <a:effectRef idx="0">
+            <a:schemeClr val="accent1"/>
+          </a:effectRef>
+          <a:fontRef idx="minor">
+            <a:schemeClr val="tx1"/>
+          </a:fontRef>
+        </p:style>
+      </p:cxnSp>
+      <p:cxnSp>
+        <p:nvCxnSpPr>
+          <p:cNvPr id="47" name="Straight Arrow Connector 46">
+            <a:extLst>
+              <a:ext uri="{FF2B5EF4-FFF2-40B4-BE49-F238E27FC236}">
+                <a16:creationId xmlns:a16="http://schemas.microsoft.com/office/drawing/2014/main" id="{E4421255-1246-EB9F-D05D-B53A1CF13B76}"/>
+              </a:ext>
+            </a:extLst>
+          </p:cNvPr>
+          <p:cNvCxnSpPr>
+            <a:cxnSpLocks/>
+            <a:stCxn id="15" idx="0"/>
+            <a:endCxn id="9" idx="2"/>
+          </p:cNvCxnSpPr>
+          <p:nvPr/>
+        </p:nvCxnSpPr>
+        <p:spPr>
+          <a:xfrm flipV="1">
+            <a:off x="3676666" y="2027208"/>
+            <a:ext cx="0" cy="2492861"/>
+          </a:xfrm>
+          <a:prstGeom prst="straightConnector1">
+            <a:avLst/>
+          </a:prstGeom>
+          <a:ln>
+            <a:solidFill>
+              <a:srgbClr val="7030A0"/>
+            </a:solidFill>
+            <a:tailEnd type="triangle"/>
+          </a:ln>
+        </p:spPr>
+        <p:style>
+          <a:lnRef idx="1">
+            <a:schemeClr val="accent1"/>
+          </a:lnRef>
+          <a:fillRef idx="0">
+            <a:schemeClr val="accent1"/>
+          </a:fillRef>
+          <a:effectRef idx="0">
+            <a:schemeClr val="accent1"/>
+          </a:effectRef>
+          <a:fontRef idx="minor">
+            <a:schemeClr val="tx1"/>
+          </a:fontRef>
+        </p:style>
+      </p:cxnSp>
+      <p:sp>
+        <p:nvSpPr>
+          <p:cNvPr id="59" name="Text Placeholder 6">
+            <a:extLst>
+              <a:ext uri="{FF2B5EF4-FFF2-40B4-BE49-F238E27FC236}">
+                <a16:creationId xmlns:a16="http://schemas.microsoft.com/office/drawing/2014/main" id="{A8B8D36F-E946-7BAE-614F-71E5EEB713F3}"/>
+              </a:ext>
+            </a:extLst>
+          </p:cNvPr>
+          <p:cNvSpPr>
+            <a:spLocks noGrp="1"/>
+          </p:cNvSpPr>
+          <p:nvPr>
+            <p:ph type="body" sz="half" idx="2"/>
+          </p:nvPr>
+        </p:nvSpPr>
+        <p:spPr>
+          <a:xfrm>
+            <a:off x="8071511" y="2851275"/>
+            <a:ext cx="3703169" cy="3420129"/>
+          </a:xfrm>
+        </p:spPr>
+        <p:txBody>
+          <a:bodyPr>
+            <a:normAutofit/>
+          </a:bodyPr>
+          <a:lstStyle/>
+          <a:p>
+            <a:r>
+              <a:rPr lang="en-US" sz="1400" dirty="0">
+                <a:solidFill>
+                  <a:schemeClr val="bg1"/>
+                </a:solidFill>
+              </a:rPr>
+              <a:t>The Agent can use tools to search for queries in external memory databases through </a:t>
+            </a:r>
+            <a:r>
+              <a:rPr lang="en-US" sz="1400" b="1" dirty="0">
+                <a:solidFill>
+                  <a:schemeClr val="bg1"/>
+                </a:solidFill>
+              </a:rPr>
+              <a:t>RAG</a:t>
+            </a:r>
+            <a:r>
+              <a:rPr lang="en-US" sz="1400" dirty="0">
+                <a:solidFill>
+                  <a:schemeClr val="bg1"/>
+                </a:solidFill>
+              </a:rPr>
+              <a:t> (Retrieval Augmented Generation).</a:t>
+            </a:r>
+          </a:p>
+          <a:p>
+            <a:r>
+              <a:rPr lang="en-US" sz="1400" dirty="0">
+                <a:solidFill>
+                  <a:schemeClr val="bg1"/>
+                </a:solidFill>
+              </a:rPr>
+              <a:t>The retrieved memories can be retrieved following diverse </a:t>
+            </a:r>
+            <a:r>
+              <a:rPr lang="en-US" sz="1400" b="1" dirty="0">
+                <a:solidFill>
+                  <a:schemeClr val="bg1"/>
+                </a:solidFill>
+              </a:rPr>
+              <a:t>metrics</a:t>
+            </a:r>
+            <a:r>
+              <a:rPr lang="en-US" sz="1400" dirty="0">
+                <a:solidFill>
+                  <a:schemeClr val="bg1"/>
+                </a:solidFill>
+              </a:rPr>
+              <a:t>:</a:t>
+            </a:r>
+          </a:p>
+          <a:p>
+            <a:pPr marL="285750" indent="-285750">
+              <a:buFontTx/>
+              <a:buChar char="-"/>
+            </a:pPr>
+            <a:r>
+              <a:rPr lang="en-US" sz="1400" b="1" dirty="0">
+                <a:solidFill>
+                  <a:schemeClr val="bg1"/>
+                </a:solidFill>
+              </a:rPr>
+              <a:t>Cosine similarity </a:t>
+            </a:r>
+            <a:r>
+              <a:rPr lang="en-US" sz="1400" dirty="0">
+                <a:solidFill>
+                  <a:schemeClr val="bg1"/>
+                </a:solidFill>
+              </a:rPr>
+              <a:t>(for vector search )</a:t>
+            </a:r>
+          </a:p>
+          <a:p>
+            <a:pPr marL="285750" indent="-285750">
+              <a:buFontTx/>
+              <a:buChar char="-"/>
+            </a:pPr>
+            <a:r>
+              <a:rPr lang="en-US" sz="1400" b="1" dirty="0">
+                <a:solidFill>
+                  <a:schemeClr val="bg1"/>
+                </a:solidFill>
+              </a:rPr>
+              <a:t>Creation time </a:t>
+            </a:r>
+            <a:r>
+              <a:rPr lang="en-US" sz="1400" dirty="0">
+                <a:solidFill>
+                  <a:schemeClr val="bg1"/>
+                </a:solidFill>
+              </a:rPr>
+              <a:t>(for vector / SQL search)</a:t>
+            </a:r>
+          </a:p>
+          <a:p>
+            <a:pPr marL="285750" indent="-285750">
+              <a:buFontTx/>
+              <a:buChar char="-"/>
+            </a:pPr>
+            <a:r>
+              <a:rPr lang="en-US" sz="1400" b="1" dirty="0">
+                <a:solidFill>
+                  <a:schemeClr val="bg1"/>
+                </a:solidFill>
+              </a:rPr>
+              <a:t>Combinations of other metrics</a:t>
+            </a:r>
+            <a:r>
+              <a:rPr lang="en-US" sz="1400" dirty="0">
+                <a:solidFill>
+                  <a:schemeClr val="bg1"/>
+                </a:solidFill>
+              </a:rPr>
+              <a:t>.</a:t>
+            </a:r>
+          </a:p>
+          <a:p>
+            <a:r>
+              <a:rPr lang="en-US" sz="1400" dirty="0">
+                <a:solidFill>
+                  <a:schemeClr val="bg1"/>
+                </a:solidFill>
+              </a:rPr>
+              <a:t>Tag filtering, time filtering, etc.</a:t>
+            </a:r>
+          </a:p>
+          <a:p>
+            <a:endParaRPr lang="en-US" sz="1400" dirty="0"/>
+          </a:p>
+          <a:p>
+            <a:endParaRPr lang="en-US" sz="1400" dirty="0"/>
+          </a:p>
+        </p:txBody>
+      </p:sp>
+      <p:sp>
+        <p:nvSpPr>
+          <p:cNvPr id="69" name="Rectangle 68">
+            <a:extLst>
+              <a:ext uri="{FF2B5EF4-FFF2-40B4-BE49-F238E27FC236}">
+                <a16:creationId xmlns:a16="http://schemas.microsoft.com/office/drawing/2014/main" id="{46B10392-1062-9DA3-90D4-05295F2598F3}"/>
+              </a:ext>
+            </a:extLst>
+          </p:cNvPr>
+          <p:cNvSpPr/>
+          <p:nvPr/>
+        </p:nvSpPr>
+        <p:spPr>
+          <a:xfrm>
+            <a:off x="2929763" y="442246"/>
+            <a:ext cx="1493806" cy="316688"/>
+          </a:xfrm>
+          <a:prstGeom prst="rect">
+            <a:avLst/>
+          </a:prstGeom>
+          <a:solidFill>
+            <a:srgbClr val="FF9933"/>
+          </a:solidFill>
+        </p:spPr>
+        <p:style>
+          <a:lnRef idx="2">
+            <a:schemeClr val="accent1">
+              <a:shade val="15000"/>
+            </a:schemeClr>
+          </a:lnRef>
+          <a:fillRef idx="1">
+            <a:schemeClr val="accent1"/>
+          </a:fillRef>
+          <a:effectRef idx="0">
+            <a:schemeClr val="accent1"/>
+          </a:effectRef>
+          <a:fontRef idx="minor">
+            <a:schemeClr val="lt1"/>
+          </a:fontRef>
+        </p:style>
+        <p:txBody>
+          <a:bodyPr rtlCol="0" anchor="ctr"/>
+          <a:lstStyle/>
+          <a:p>
+            <a:pPr algn="ctr"/>
+            <a:r>
+              <a:rPr lang="es-ES" dirty="0"/>
+              <a:t>User</a:t>
+            </a:r>
+            <a:endParaRPr lang="en-US" dirty="0"/>
+          </a:p>
+        </p:txBody>
+      </p:sp>
+      <mc:AlternateContent xmlns:mc="http://schemas.openxmlformats.org/markup-compatibility/2006">
+        <mc:Choice xmlns:a14="http://schemas.microsoft.com/office/drawing/2010/main" Requires="a14">
+          <p:sp>
+            <p:nvSpPr>
+              <p:cNvPr id="70" name="TextBox 69">
+                <a:extLst>
+                  <a:ext uri="{FF2B5EF4-FFF2-40B4-BE49-F238E27FC236}">
+                    <a16:creationId xmlns:a16="http://schemas.microsoft.com/office/drawing/2014/main" id="{62210D3D-1723-2D39-B430-597D250F45EE}"/>
+                  </a:ext>
+                </a:extLst>
+              </p:cNvPr>
+              <p:cNvSpPr txBox="1"/>
+              <p:nvPr/>
+            </p:nvSpPr>
+            <p:spPr>
+              <a:xfrm>
+                <a:off x="2449402" y="966487"/>
+                <a:ext cx="2454528" cy="461665"/>
+              </a:xfrm>
+              <a:prstGeom prst="rect">
+                <a:avLst/>
+              </a:prstGeom>
+              <a:solidFill>
+                <a:srgbClr val="FFCC66"/>
+              </a:solidFill>
+            </p:spPr>
+            <p:txBody>
+              <a:bodyPr wrap="square">
+                <a:spAutoFit/>
+              </a:bodyPr>
+              <a:lstStyle/>
+              <a:p>
+                <a:pPr algn="ctr"/>
+                <a14:m>
+                  <m:oMath xmlns:m="http://schemas.openxmlformats.org/officeDocument/2006/math">
+                    <m:r>
+                      <m:rPr>
+                        <m:nor/>
+                      </m:rPr>
+                      <a:rPr lang="es-ES" sz="1200" b="0" i="0" smtClean="0">
+                        <a:latin typeface="Cambria Math" panose="02040503050406030204" pitchFamily="18" charset="0"/>
+                      </a:rPr>
+                      <m:t>message</m:t>
+                    </m:r>
+                  </m:oMath>
+                </a14:m>
+                <a:r>
+                  <a:rPr lang="en-US" sz="1200" dirty="0"/>
+                  <a:t>: </a:t>
+                </a:r>
+              </a:p>
+              <a:p>
+                <a:pPr algn="ctr"/>
+                <a:r>
+                  <a:rPr lang="en-US" sz="1200" dirty="0"/>
+                  <a:t>“Order my favorite food.”</a:t>
+                </a:r>
+              </a:p>
+            </p:txBody>
+          </p:sp>
+        </mc:Choice>
+        <mc:Fallback>
+          <p:sp>
+            <p:nvSpPr>
+              <p:cNvPr id="70" name="TextBox 69">
+                <a:extLst>
+                  <a:ext uri="{FF2B5EF4-FFF2-40B4-BE49-F238E27FC236}">
+                    <a16:creationId xmlns:a16="http://schemas.microsoft.com/office/drawing/2014/main" id="{62210D3D-1723-2D39-B430-597D250F45EE}"/>
+                  </a:ext>
+                </a:extLst>
+              </p:cNvPr>
+              <p:cNvSpPr txBox="1">
+                <a:spLocks noRot="1" noChangeAspect="1" noMove="1" noResize="1" noEditPoints="1" noAdjustHandles="1" noChangeArrowheads="1" noChangeShapeType="1" noTextEdit="1"/>
+              </p:cNvSpPr>
+              <p:nvPr/>
+            </p:nvSpPr>
+            <p:spPr>
+              <a:xfrm>
+                <a:off x="2449402" y="966487"/>
+                <a:ext cx="2454528" cy="461665"/>
+              </a:xfrm>
+              <a:prstGeom prst="rect">
+                <a:avLst/>
+              </a:prstGeom>
+              <a:blipFill>
+                <a:blip r:embed="rId6"/>
+                <a:stretch>
+                  <a:fillRect t="-1333" b="-10667"/>
+                </a:stretch>
+              </a:blipFill>
+            </p:spPr>
+            <p:txBody>
+              <a:bodyPr/>
+              <a:lstStyle/>
+              <a:p>
+                <a:r>
+                  <a:rPr lang="en-US">
+                    <a:noFill/>
+                  </a:rPr>
+                  <a:t> </a:t>
+                </a:r>
+              </a:p>
+            </p:txBody>
+          </p:sp>
+        </mc:Fallback>
+      </mc:AlternateContent>
+      <p:cxnSp>
+        <p:nvCxnSpPr>
+          <p:cNvPr id="82" name="Straight Arrow Connector 81">
+            <a:extLst>
+              <a:ext uri="{FF2B5EF4-FFF2-40B4-BE49-F238E27FC236}">
+                <a16:creationId xmlns:a16="http://schemas.microsoft.com/office/drawing/2014/main" id="{D85AD7B0-24D9-C009-E51C-475A506C8D83}"/>
+              </a:ext>
+            </a:extLst>
+          </p:cNvPr>
+          <p:cNvCxnSpPr>
+            <a:cxnSpLocks/>
+            <a:stCxn id="70" idx="2"/>
+            <a:endCxn id="9" idx="0"/>
+          </p:cNvCxnSpPr>
+          <p:nvPr/>
+        </p:nvCxnSpPr>
+        <p:spPr>
+          <a:xfrm>
+            <a:off x="3676666" y="1428152"/>
+            <a:ext cx="0" cy="161867"/>
+          </a:xfrm>
+          <a:prstGeom prst="straightConnector1">
+            <a:avLst/>
+          </a:prstGeom>
+          <a:ln>
+            <a:solidFill>
+              <a:srgbClr val="FF9933"/>
+            </a:solidFill>
+            <a:tailEnd type="triangle"/>
+          </a:ln>
+        </p:spPr>
+        <p:style>
+          <a:lnRef idx="1">
+            <a:schemeClr val="accent1"/>
+          </a:lnRef>
+          <a:fillRef idx="0">
+            <a:schemeClr val="accent1"/>
+          </a:fillRef>
+          <a:effectRef idx="0">
+            <a:schemeClr val="accent1"/>
+          </a:effectRef>
+          <a:fontRef idx="minor">
+            <a:schemeClr val="tx1"/>
+          </a:fontRef>
+        </p:style>
+      </p:cxnSp>
+      <p:cxnSp>
+        <p:nvCxnSpPr>
+          <p:cNvPr id="89" name="Straight Arrow Connector 88">
+            <a:extLst>
+              <a:ext uri="{FF2B5EF4-FFF2-40B4-BE49-F238E27FC236}">
+                <a16:creationId xmlns:a16="http://schemas.microsoft.com/office/drawing/2014/main" id="{AD728D71-6A65-B046-B45C-48C529704AFA}"/>
+              </a:ext>
+            </a:extLst>
+          </p:cNvPr>
+          <p:cNvCxnSpPr>
+            <a:cxnSpLocks/>
+            <a:stCxn id="69" idx="2"/>
+            <a:endCxn id="70" idx="0"/>
+          </p:cNvCxnSpPr>
+          <p:nvPr/>
+        </p:nvCxnSpPr>
+        <p:spPr>
+          <a:xfrm>
+            <a:off x="3676666" y="758934"/>
+            <a:ext cx="0" cy="207553"/>
+          </a:xfrm>
+          <a:prstGeom prst="straightConnector1">
+            <a:avLst/>
+          </a:prstGeom>
+          <a:ln>
+            <a:solidFill>
+              <a:srgbClr val="FF9933"/>
+            </a:solidFill>
+            <a:tailEnd type="triangle"/>
+          </a:ln>
+        </p:spPr>
+        <p:style>
+          <a:lnRef idx="1">
+            <a:schemeClr val="accent1"/>
+          </a:lnRef>
+          <a:fillRef idx="0">
+            <a:schemeClr val="accent1"/>
+          </a:fillRef>
+          <a:effectRef idx="0">
+            <a:schemeClr val="accent1"/>
+          </a:effectRef>
+          <a:fontRef idx="minor">
+            <a:schemeClr val="tx1"/>
+          </a:fontRef>
+        </p:style>
+      </p:cxnSp>
+      <p:sp>
+        <p:nvSpPr>
+          <p:cNvPr id="103" name="TextBox 102">
+            <a:extLst>
+              <a:ext uri="{FF2B5EF4-FFF2-40B4-BE49-F238E27FC236}">
+                <a16:creationId xmlns:a16="http://schemas.microsoft.com/office/drawing/2014/main" id="{B9D95E81-DB28-240B-1A0A-0607560F5BF2}"/>
+              </a:ext>
+            </a:extLst>
+          </p:cNvPr>
+          <p:cNvSpPr txBox="1"/>
+          <p:nvPr/>
+        </p:nvSpPr>
+        <p:spPr>
+          <a:xfrm>
+            <a:off x="1420330" y="2074631"/>
+            <a:ext cx="440240" cy="276999"/>
+          </a:xfrm>
+          <a:prstGeom prst="rect">
+            <a:avLst/>
+          </a:prstGeom>
+          <a:solidFill>
+            <a:srgbClr val="FF9999"/>
+          </a:solidFill>
+        </p:spPr>
+        <p:txBody>
+          <a:bodyPr wrap="square">
+            <a:spAutoFit/>
+          </a:bodyPr>
+          <a:lstStyle/>
+          <a:p>
+            <a:pPr algn="ctr"/>
+            <a:r>
+              <a:rPr lang="es-ES" sz="1200" dirty="0"/>
+              <a:t>tool</a:t>
+            </a:r>
+            <a:endParaRPr lang="en-US" sz="1200" dirty="0"/>
+          </a:p>
+        </p:txBody>
+      </p:sp>
+      <p:sp>
+        <p:nvSpPr>
+          <p:cNvPr id="104" name="TextBox 103">
+            <a:extLst>
+              <a:ext uri="{FF2B5EF4-FFF2-40B4-BE49-F238E27FC236}">
+                <a16:creationId xmlns:a16="http://schemas.microsoft.com/office/drawing/2014/main" id="{72832AC5-15B6-087C-C64A-7D5090EDEB55}"/>
+              </a:ext>
+            </a:extLst>
+          </p:cNvPr>
+          <p:cNvSpPr txBox="1"/>
+          <p:nvPr/>
+        </p:nvSpPr>
+        <p:spPr>
+          <a:xfrm>
+            <a:off x="5355074" y="2071250"/>
+            <a:ext cx="440240" cy="276999"/>
+          </a:xfrm>
+          <a:prstGeom prst="rect">
+            <a:avLst/>
+          </a:prstGeom>
+          <a:solidFill>
+            <a:srgbClr val="FF9999"/>
+          </a:solidFill>
+        </p:spPr>
+        <p:txBody>
+          <a:bodyPr wrap="square">
+            <a:spAutoFit/>
+          </a:bodyPr>
+          <a:lstStyle/>
+          <a:p>
+            <a:pPr algn="ctr"/>
+            <a:r>
+              <a:rPr lang="es-ES" sz="1200" dirty="0"/>
+              <a:t>tool</a:t>
+            </a:r>
+            <a:endParaRPr lang="en-US" sz="1200" dirty="0"/>
+          </a:p>
+        </p:txBody>
+      </p:sp>
+      <p:sp>
+        <p:nvSpPr>
+          <p:cNvPr id="106" name="TextBox 105">
+            <a:extLst>
+              <a:ext uri="{FF2B5EF4-FFF2-40B4-BE49-F238E27FC236}">
+                <a16:creationId xmlns:a16="http://schemas.microsoft.com/office/drawing/2014/main" id="{CE01D967-EF46-E62F-9F76-30FDE6C63C87}"/>
+              </a:ext>
+            </a:extLst>
+          </p:cNvPr>
+          <p:cNvSpPr txBox="1"/>
+          <p:nvPr/>
+        </p:nvSpPr>
+        <p:spPr>
+          <a:xfrm>
+            <a:off x="707797" y="6140640"/>
+            <a:ext cx="1677276" cy="276999"/>
+          </a:xfrm>
+          <a:prstGeom prst="rect">
+            <a:avLst/>
+          </a:prstGeom>
+          <a:noFill/>
+        </p:spPr>
+        <p:txBody>
+          <a:bodyPr wrap="square">
+            <a:spAutoFit/>
+          </a:bodyPr>
+          <a:lstStyle/>
+          <a:p>
+            <a:pPr algn="ctr"/>
+            <a:r>
+              <a:rPr lang="es-ES" sz="1200" dirty="0" err="1">
+                <a:solidFill>
+                  <a:srgbClr val="7030A0"/>
+                </a:solidFill>
+              </a:rPr>
+              <a:t>chromaDB</a:t>
+            </a:r>
+            <a:r>
+              <a:rPr lang="es-ES" sz="1200" dirty="0">
+                <a:solidFill>
+                  <a:srgbClr val="7030A0"/>
+                </a:solidFill>
+              </a:rPr>
+              <a:t>, FAISS, etc.</a:t>
+            </a:r>
+            <a:endParaRPr lang="en-US" sz="1200" dirty="0">
+              <a:solidFill>
+                <a:srgbClr val="7030A0"/>
+              </a:solidFill>
+            </a:endParaRPr>
+          </a:p>
+        </p:txBody>
+      </p:sp>
+      <p:sp>
+        <p:nvSpPr>
+          <p:cNvPr id="107" name="TextBox 106">
+            <a:extLst>
+              <a:ext uri="{FF2B5EF4-FFF2-40B4-BE49-F238E27FC236}">
+                <a16:creationId xmlns:a16="http://schemas.microsoft.com/office/drawing/2014/main" id="{92C44D70-655B-5799-D1BE-84237E86B0CD}"/>
+              </a:ext>
+            </a:extLst>
+          </p:cNvPr>
+          <p:cNvSpPr txBox="1"/>
+          <p:nvPr/>
+        </p:nvSpPr>
+        <p:spPr>
+          <a:xfrm>
+            <a:off x="4710958" y="6132904"/>
+            <a:ext cx="1677276" cy="276999"/>
+          </a:xfrm>
+          <a:prstGeom prst="rect">
+            <a:avLst/>
+          </a:prstGeom>
+          <a:noFill/>
+        </p:spPr>
+        <p:txBody>
+          <a:bodyPr wrap="square">
+            <a:spAutoFit/>
+          </a:bodyPr>
+          <a:lstStyle/>
+          <a:p>
+            <a:pPr algn="ctr"/>
+            <a:r>
+              <a:rPr lang="es-ES" sz="1200" dirty="0">
+                <a:solidFill>
+                  <a:srgbClr val="7030A0"/>
+                </a:solidFill>
+              </a:rPr>
+              <a:t>sqlite3</a:t>
+            </a:r>
+            <a:endParaRPr lang="en-US" sz="1200" dirty="0">
+              <a:solidFill>
+                <a:srgbClr val="7030A0"/>
+              </a:solidFill>
+            </a:endParaRPr>
+          </a:p>
+        </p:txBody>
+      </p:sp>
     </p:spTree>
     <p:extLst>
       <p:ext uri="{BB962C8B-B14F-4D97-AF65-F5344CB8AC3E}">
         <p14:creationId xmlns:p14="http://schemas.microsoft.com/office/powerpoint/2010/main" val="3857995518"/>
+      </p:ext>
+    </p:extLst>
+  </p:cSld>
+  <p:clrMapOvr>
+    <a:masterClrMapping/>
+  </p:clrMapOvr>
+</p:sld>
+</file>
+
+<file path=ppt/slides/slide9.xml><?xml version="1.0" encoding="utf-8"?>
+<p:sld xmlns:a="http://schemas.openxmlformats.org/drawingml/2006/main" xmlns:r="http://schemas.openxmlformats.org/officeDocument/2006/relationships" xmlns:p="http://schemas.openxmlformats.org/presentationml/2006/main">
+  <p:cSld>
+    <p:spTree>
+      <p:nvGrpSpPr>
+        <p:cNvPr id="1" name="">
+          <a:extLst>
+            <a:ext uri="{FF2B5EF4-FFF2-40B4-BE49-F238E27FC236}">
+              <a16:creationId xmlns:a16="http://schemas.microsoft.com/office/drawing/2014/main" id="{18EAC192-6989-6A02-1414-0130CF1015FF}"/>
+            </a:ext>
+          </a:extLst>
+        </p:cNvPr>
+        <p:cNvGrpSpPr/>
+        <p:nvPr/>
+      </p:nvGrpSpPr>
+      <p:grpSpPr>
+        <a:xfrm>
+          <a:off x="0" y="0"/>
+          <a:ext cx="0" cy="0"/>
+          <a:chOff x="0" y="0"/>
+          <a:chExt cx="0" cy="0"/>
+        </a:xfrm>
+      </p:grpSpPr>
+      <p:sp>
+        <p:nvSpPr>
+          <p:cNvPr id="5" name="Title 4">
+            <a:extLst>
+              <a:ext uri="{FF2B5EF4-FFF2-40B4-BE49-F238E27FC236}">
+                <a16:creationId xmlns:a16="http://schemas.microsoft.com/office/drawing/2014/main" id="{CAD2BE38-3AD9-02B2-7C16-FD59B1B01A2B}"/>
+              </a:ext>
+            </a:extLst>
+          </p:cNvPr>
+          <p:cNvSpPr>
+            <a:spLocks noGrp="1"/>
+          </p:cNvSpPr>
+          <p:nvPr>
+            <p:ph type="title"/>
+          </p:nvPr>
+        </p:nvSpPr>
+        <p:spPr>
+          <a:xfrm>
+            <a:off x="7858664" y="1"/>
+            <a:ext cx="4226943" cy="2717800"/>
+          </a:xfrm>
+        </p:spPr>
+        <p:txBody>
+          <a:bodyPr/>
+          <a:lstStyle/>
+          <a:p>
+            <a:r>
+              <a:rPr lang="en-US" dirty="0"/>
+              <a:t>Long Term/</a:t>
+            </a:r>
+            <a:br>
+              <a:rPr lang="en-US" dirty="0"/>
+            </a:br>
+            <a:r>
+              <a:rPr lang="en-US" dirty="0"/>
+              <a:t>Off-Context Memory</a:t>
+            </a:r>
+            <a:br>
+              <a:rPr lang="en-US" dirty="0"/>
+            </a:br>
+            <a:endParaRPr lang="en-US" dirty="0"/>
+          </a:p>
+        </p:txBody>
+      </p:sp>
+      <p:sp>
+        <p:nvSpPr>
+          <p:cNvPr id="4" name="Text Placeholder 6">
+            <a:extLst>
+              <a:ext uri="{FF2B5EF4-FFF2-40B4-BE49-F238E27FC236}">
+                <a16:creationId xmlns:a16="http://schemas.microsoft.com/office/drawing/2014/main" id="{58D08AC1-1419-E22B-0F20-8A1F7027064C}"/>
+              </a:ext>
+            </a:extLst>
+          </p:cNvPr>
+          <p:cNvSpPr txBox="1">
+            <a:spLocks/>
+          </p:cNvSpPr>
+          <p:nvPr/>
+        </p:nvSpPr>
+        <p:spPr>
+          <a:xfrm>
+            <a:off x="7858664" y="2224842"/>
+            <a:ext cx="3916017" cy="373131"/>
+          </a:xfrm>
+          <a:prstGeom prst="rect">
+            <a:avLst/>
+          </a:prstGeom>
+        </p:spPr>
+        <p:txBody>
+          <a:bodyPr vert="horz" lIns="91440" tIns="45720" rIns="91440" bIns="45720" rtlCol="0">
+            <a:normAutofit/>
+          </a:bodyPr>
+          <a:lstStyle>
+            <a:lvl1pPr marL="0" marR="0" indent="0" algn="l" defTabSz="914400" rtl="0" eaLnBrk="1" fontAlgn="auto" latinLnBrk="0" hangingPunct="1">
+              <a:lnSpc>
+                <a:spcPct val="100000"/>
+              </a:lnSpc>
+              <a:spcBef>
+                <a:spcPts val="1200"/>
+              </a:spcBef>
+              <a:spcAft>
+                <a:spcPts val="0"/>
+              </a:spcAft>
+              <a:buClrTx/>
+              <a:buSzTx/>
+              <a:buFontTx/>
+              <a:buNone/>
+              <a:tabLst/>
+              <a:defRPr sz="1800" kern="1200">
+                <a:solidFill>
+                  <a:srgbClr val="262626"/>
+                </a:solidFill>
+                <a:latin typeface="+mn-lt"/>
+                <a:ea typeface="+mn-ea"/>
+                <a:cs typeface="+mn-cs"/>
+              </a:defRPr>
+            </a:lvl1pPr>
+            <a:lvl2pPr marL="457200" indent="0" algn="l" defTabSz="914400" rtl="0" eaLnBrk="1" latinLnBrk="0" hangingPunct="1">
+              <a:lnSpc>
+                <a:spcPct val="85000"/>
+              </a:lnSpc>
+              <a:spcBef>
+                <a:spcPts val="600"/>
+              </a:spcBef>
+              <a:buFont typeface="Arial" pitchFamily="34" charset="0"/>
+              <a:buNone/>
+              <a:defRPr sz="1200" kern="1200">
+                <a:solidFill>
+                  <a:schemeClr val="tx1">
+                    <a:lumMod val="85000"/>
+                    <a:lumOff val="15000"/>
+                  </a:schemeClr>
+                </a:solidFill>
+                <a:latin typeface="+mn-lt"/>
+                <a:ea typeface="+mn-ea"/>
+                <a:cs typeface="+mn-cs"/>
+              </a:defRPr>
+            </a:lvl2pPr>
+            <a:lvl3pPr marL="914400" indent="0" algn="l" defTabSz="914400" rtl="0" eaLnBrk="1" latinLnBrk="0" hangingPunct="1">
+              <a:lnSpc>
+                <a:spcPct val="85000"/>
+              </a:lnSpc>
+              <a:spcBef>
+                <a:spcPts val="600"/>
+              </a:spcBef>
+              <a:buFont typeface="Arial" pitchFamily="34" charset="0"/>
+              <a:buNone/>
+              <a:defRPr sz="1000" i="1" kern="1200">
+                <a:solidFill>
+                  <a:schemeClr val="tx1">
+                    <a:lumMod val="85000"/>
+                    <a:lumOff val="15000"/>
+                  </a:schemeClr>
+                </a:solidFill>
+                <a:latin typeface="+mn-lt"/>
+                <a:ea typeface="+mn-ea"/>
+                <a:cs typeface="+mn-cs"/>
+              </a:defRPr>
+            </a:lvl3pPr>
+            <a:lvl4pPr marL="1371600" indent="0" algn="l" defTabSz="914400" rtl="0" eaLnBrk="1" latinLnBrk="0" hangingPunct="1">
+              <a:lnSpc>
+                <a:spcPct val="85000"/>
+              </a:lnSpc>
+              <a:spcBef>
+                <a:spcPts val="600"/>
+              </a:spcBef>
+              <a:buFont typeface="Arial" pitchFamily="34" charset="0"/>
+              <a:buNone/>
+              <a:defRPr sz="900" kern="1200">
+                <a:solidFill>
+                  <a:schemeClr val="tx1">
+                    <a:lumMod val="85000"/>
+                    <a:lumOff val="15000"/>
+                  </a:schemeClr>
+                </a:solidFill>
+                <a:latin typeface="+mn-lt"/>
+                <a:ea typeface="+mn-ea"/>
+                <a:cs typeface="+mn-cs"/>
+              </a:defRPr>
+            </a:lvl4pPr>
+            <a:lvl5pPr marL="1828800" indent="0" algn="l" defTabSz="914400" rtl="0" eaLnBrk="1" latinLnBrk="0" hangingPunct="1">
+              <a:lnSpc>
+                <a:spcPct val="85000"/>
+              </a:lnSpc>
+              <a:spcBef>
+                <a:spcPts val="600"/>
+              </a:spcBef>
+              <a:buFont typeface="Arial" pitchFamily="34" charset="0"/>
+              <a:buNone/>
+              <a:defRPr sz="900" kern="1200">
+                <a:solidFill>
+                  <a:schemeClr val="tx1">
+                    <a:lumMod val="85000"/>
+                    <a:lumOff val="15000"/>
+                  </a:schemeClr>
+                </a:solidFill>
+                <a:latin typeface="+mn-lt"/>
+                <a:ea typeface="+mn-ea"/>
+                <a:cs typeface="+mn-cs"/>
+              </a:defRPr>
+            </a:lvl5pPr>
+            <a:lvl6pPr marL="2286000" indent="0" algn="l" defTabSz="914400" rtl="0" eaLnBrk="1" latinLnBrk="0" hangingPunct="1">
+              <a:lnSpc>
+                <a:spcPct val="85000"/>
+              </a:lnSpc>
+              <a:spcBef>
+                <a:spcPts val="600"/>
+              </a:spcBef>
+              <a:buFont typeface="Arial" pitchFamily="34" charset="0"/>
+              <a:buNone/>
+              <a:defRPr sz="900" kern="1200">
+                <a:solidFill>
+                  <a:schemeClr val="tx1">
+                    <a:lumMod val="85000"/>
+                    <a:lumOff val="15000"/>
+                  </a:schemeClr>
+                </a:solidFill>
+                <a:latin typeface="+mn-lt"/>
+                <a:ea typeface="+mn-ea"/>
+                <a:cs typeface="+mn-cs"/>
+              </a:defRPr>
+            </a:lvl6pPr>
+            <a:lvl7pPr marL="2743200" indent="0" algn="l" defTabSz="914400" rtl="0" eaLnBrk="1" latinLnBrk="0" hangingPunct="1">
+              <a:lnSpc>
+                <a:spcPct val="85000"/>
+              </a:lnSpc>
+              <a:spcBef>
+                <a:spcPts val="600"/>
+              </a:spcBef>
+              <a:buFont typeface="Arial" pitchFamily="34" charset="0"/>
+              <a:buNone/>
+              <a:defRPr sz="900" kern="1200">
+                <a:solidFill>
+                  <a:schemeClr val="tx1">
+                    <a:lumMod val="85000"/>
+                    <a:lumOff val="15000"/>
+                  </a:schemeClr>
+                </a:solidFill>
+                <a:latin typeface="+mn-lt"/>
+                <a:ea typeface="+mn-ea"/>
+                <a:cs typeface="+mn-cs"/>
+              </a:defRPr>
+            </a:lvl7pPr>
+            <a:lvl8pPr marL="3200400" indent="0" algn="l" defTabSz="914400" rtl="0" eaLnBrk="1" latinLnBrk="0" hangingPunct="1">
+              <a:lnSpc>
+                <a:spcPct val="85000"/>
+              </a:lnSpc>
+              <a:spcBef>
+                <a:spcPts val="600"/>
+              </a:spcBef>
+              <a:buFont typeface="Arial" pitchFamily="34" charset="0"/>
+              <a:buNone/>
+              <a:defRPr sz="900" kern="1200">
+                <a:solidFill>
+                  <a:schemeClr val="tx1">
+                    <a:lumMod val="85000"/>
+                    <a:lumOff val="15000"/>
+                  </a:schemeClr>
+                </a:solidFill>
+                <a:latin typeface="+mn-lt"/>
+                <a:ea typeface="+mn-ea"/>
+                <a:cs typeface="+mn-cs"/>
+              </a:defRPr>
+            </a:lvl8pPr>
+            <a:lvl9pPr marL="3657600" indent="0" algn="l" defTabSz="914400" rtl="0" eaLnBrk="1" latinLnBrk="0" hangingPunct="1">
+              <a:lnSpc>
+                <a:spcPct val="85000"/>
+              </a:lnSpc>
+              <a:spcBef>
+                <a:spcPts val="600"/>
+              </a:spcBef>
+              <a:buFont typeface="Arial" pitchFamily="34" charset="0"/>
+              <a:buNone/>
+              <a:defRPr sz="900" kern="1200">
+                <a:solidFill>
+                  <a:schemeClr val="tx1">
+                    <a:lumMod val="85000"/>
+                    <a:lumOff val="15000"/>
+                  </a:schemeClr>
+                </a:solidFill>
+                <a:latin typeface="+mn-lt"/>
+                <a:ea typeface="+mn-ea"/>
+                <a:cs typeface="+mn-cs"/>
+              </a:defRPr>
+            </a:lvl9pPr>
+          </a:lstStyle>
+          <a:p>
+            <a:r>
+              <a:rPr lang="es-ES" dirty="0" err="1">
+                <a:effectLst>
+                  <a:outerShdw blurRad="38100" dist="38100" dir="2700000" algn="tl">
+                    <a:srgbClr val="000000">
+                      <a:alpha val="43137"/>
+                    </a:srgbClr>
+                  </a:outerShdw>
+                </a:effectLst>
+              </a:rPr>
+              <a:t>Retrieval</a:t>
+            </a:r>
+            <a:r>
+              <a:rPr lang="es-ES" dirty="0">
+                <a:effectLst>
+                  <a:outerShdw blurRad="38100" dist="38100" dir="2700000" algn="tl">
+                    <a:srgbClr val="000000">
+                      <a:alpha val="43137"/>
+                    </a:srgbClr>
+                  </a:outerShdw>
+                </a:effectLst>
+              </a:rPr>
+              <a:t> Score (</a:t>
+            </a:r>
+            <a:r>
+              <a:rPr lang="es-ES" dirty="0" err="1">
+                <a:effectLst>
+                  <a:outerShdw blurRad="38100" dist="38100" dir="2700000" algn="tl">
+                    <a:srgbClr val="000000">
+                      <a:alpha val="43137"/>
+                    </a:srgbClr>
+                  </a:outerShdw>
+                </a:effectLst>
+              </a:rPr>
+              <a:t>MemGPT</a:t>
+            </a:r>
+            <a:r>
+              <a:rPr lang="es-ES" dirty="0">
+                <a:effectLst>
+                  <a:outerShdw blurRad="38100" dist="38100" dir="2700000" algn="tl">
+                    <a:srgbClr val="000000">
+                      <a:alpha val="43137"/>
+                    </a:srgbClr>
+                  </a:outerShdw>
+                </a:effectLst>
+              </a:rPr>
+              <a:t>)</a:t>
+            </a:r>
+            <a:endParaRPr lang="en-US" dirty="0">
+              <a:effectLst>
+                <a:outerShdw blurRad="38100" dist="38100" dir="2700000" algn="tl">
+                  <a:srgbClr val="000000">
+                    <a:alpha val="43137"/>
+                  </a:srgbClr>
+                </a:outerShdw>
+              </a:effectLst>
+            </a:endParaRPr>
+          </a:p>
+        </p:txBody>
+      </p:sp>
+      <mc:AlternateContent xmlns:mc="http://schemas.openxmlformats.org/markup-compatibility/2006">
+        <mc:Choice xmlns:a14="http://schemas.microsoft.com/office/drawing/2010/main" Requires="a14">
+          <p:sp>
+            <p:nvSpPr>
+              <p:cNvPr id="2" name="TextBox 1">
+                <a:extLst>
+                  <a:ext uri="{FF2B5EF4-FFF2-40B4-BE49-F238E27FC236}">
+                    <a16:creationId xmlns:a16="http://schemas.microsoft.com/office/drawing/2014/main" id="{5C49B147-5917-209A-20BC-82E3A1E39701}"/>
+                  </a:ext>
+                </a:extLst>
+              </p:cNvPr>
+              <p:cNvSpPr txBox="1"/>
+              <p:nvPr/>
+            </p:nvSpPr>
+            <p:spPr>
+              <a:xfrm>
+                <a:off x="8676736" y="5265647"/>
+                <a:ext cx="2485845" cy="1344086"/>
+              </a:xfrm>
+              <a:prstGeom prst="rect">
+                <a:avLst/>
+              </a:prstGeom>
+              <a:solidFill>
+                <a:schemeClr val="bg1"/>
+              </a:solidFill>
+              <a:effectLst>
+                <a:outerShdw blurRad="50800" dist="38100" dir="2700000" algn="tl" rotWithShape="0">
+                  <a:prstClr val="black">
+                    <a:alpha val="40000"/>
+                  </a:prstClr>
+                </a:outerShdw>
+              </a:effectLst>
+            </p:spPr>
+            <p:txBody>
+              <a:bodyPr wrap="square" lIns="0" tIns="0" rIns="0" bIns="0" rtlCol="0">
+                <a:spAutoFit/>
+              </a:bodyPr>
+              <a:lstStyle/>
+              <a:p>
+                <a:pPr algn="ctr">
+                  <a:lnSpc>
+                    <a:spcPct val="150000"/>
+                  </a:lnSpc>
+                </a:pPr>
+                <a14:m>
+                  <m:oMath xmlns:m="http://schemas.openxmlformats.org/officeDocument/2006/math">
+                    <m:r>
+                      <a:rPr lang="es-ES" sz="1400" b="1" i="1" smtClean="0">
+                        <a:latin typeface="Cambria Math" panose="02040503050406030204" pitchFamily="18" charset="0"/>
+                      </a:rPr>
+                      <m:t>𝒔</m:t>
+                    </m:r>
+                    <m:r>
+                      <m:rPr>
+                        <m:nor/>
+                      </m:rPr>
+                      <a:rPr lang="es-ES" sz="1400" b="1" i="0" smtClean="0">
+                        <a:latin typeface="Cambria Math" panose="02040503050406030204" pitchFamily="18" charset="0"/>
+                      </a:rPr>
+                      <m:t>core</m:t>
+                    </m:r>
+                  </m:oMath>
+                </a14:m>
+                <a:r>
+                  <a:rPr lang="es-ES" sz="1400" b="1" i="0" dirty="0">
+                    <a:latin typeface="Cambria Math" panose="02040503050406030204" pitchFamily="18" charset="0"/>
+                  </a:rPr>
+                  <a:t> =</a:t>
+                </a:r>
+                <a14:m>
+                  <m:oMath xmlns:m="http://schemas.openxmlformats.org/officeDocument/2006/math">
+                    <m:r>
+                      <a:rPr lang="es-ES" sz="1400" b="1" i="0" smtClean="0">
+                        <a:latin typeface="Cambria Math" panose="02040503050406030204" pitchFamily="18" charset="0"/>
+                      </a:rPr>
+                      <m:t> </m:t>
+                    </m:r>
+                  </m:oMath>
+                </a14:m>
+                <a:endParaRPr lang="es-ES" sz="1400" b="1" i="0" dirty="0">
+                  <a:latin typeface="Cambria Math" panose="02040503050406030204" pitchFamily="18" charset="0"/>
+                </a:endParaRPr>
+              </a:p>
+              <a:p>
+                <a:pPr algn="ctr">
+                  <a:lnSpc>
+                    <a:spcPct val="150000"/>
+                  </a:lnSpc>
+                </a:pPr>
+                <a14:m>
+                  <m:oMath xmlns:m="http://schemas.openxmlformats.org/officeDocument/2006/math">
+                    <m:sSub>
+                      <m:sSubPr>
+                        <m:ctrlPr>
+                          <a:rPr lang="es-ES" sz="1400" b="1" i="1" smtClean="0">
+                            <a:solidFill>
+                              <a:schemeClr val="tx2">
+                                <a:lumMod val="90000"/>
+                                <a:lumOff val="10000"/>
+                              </a:schemeClr>
+                            </a:solidFill>
+                            <a:latin typeface="Cambria Math" panose="02040503050406030204" pitchFamily="18" charset="0"/>
+                          </a:rPr>
+                        </m:ctrlPr>
+                      </m:sSubPr>
+                      <m:e>
+                        <m:r>
+                          <a:rPr lang="el-GR" sz="1400" b="1" i="1">
+                            <a:solidFill>
+                              <a:schemeClr val="tx2">
+                                <a:lumMod val="90000"/>
+                                <a:lumOff val="10000"/>
+                              </a:schemeClr>
+                            </a:solidFill>
+                            <a:latin typeface="Cambria Math" panose="02040503050406030204" pitchFamily="18" charset="0"/>
+                            <a:ea typeface="Cambria Math" panose="02040503050406030204" pitchFamily="18" charset="0"/>
+                          </a:rPr>
+                          <m:t>𝜶</m:t>
+                        </m:r>
+                      </m:e>
+                      <m:sub>
+                        <m:r>
+                          <m:rPr>
+                            <m:nor/>
+                          </m:rPr>
+                          <a:rPr lang="es-ES" sz="1400" b="1" i="0" smtClean="0">
+                            <a:solidFill>
+                              <a:schemeClr val="tx2">
+                                <a:lumMod val="90000"/>
+                                <a:lumOff val="10000"/>
+                              </a:schemeClr>
+                            </a:solidFill>
+                            <a:latin typeface="Cambria Math" panose="02040503050406030204" pitchFamily="18" charset="0"/>
+                          </a:rPr>
+                          <m:t>imp</m:t>
+                        </m:r>
+                      </m:sub>
+                    </m:sSub>
+                    <m:r>
+                      <m:rPr>
+                        <m:nor/>
+                      </m:rPr>
+                      <a:rPr lang="es-ES" sz="1400" b="1" i="0" smtClean="0">
+                        <a:latin typeface="Cambria Math" panose="02040503050406030204" pitchFamily="18" charset="0"/>
+                      </a:rPr>
+                      <m:t> </m:t>
+                    </m:r>
+                    <m:r>
+                      <m:rPr>
+                        <m:nor/>
+                      </m:rPr>
+                      <a:rPr lang="es-ES" sz="1400" b="1" i="0" smtClean="0">
+                        <a:latin typeface="Cambria Math" panose="02040503050406030204" pitchFamily="18" charset="0"/>
+                      </a:rPr>
+                      <m:t>importance</m:t>
+                    </m:r>
+                    <m:d>
+                      <m:dPr>
+                        <m:ctrlPr>
+                          <a:rPr lang="es-ES" sz="1400" b="1" i="1" smtClean="0">
+                            <a:latin typeface="Cambria Math" panose="02040503050406030204" pitchFamily="18" charset="0"/>
+                          </a:rPr>
+                        </m:ctrlPr>
+                      </m:dPr>
+                      <m:e>
+                        <m:r>
+                          <a:rPr lang="es-ES" sz="1400" b="1" i="1" smtClean="0">
+                            <a:latin typeface="Cambria Math" panose="02040503050406030204" pitchFamily="18" charset="0"/>
+                          </a:rPr>
+                          <m:t>𝒎</m:t>
+                        </m:r>
+                      </m:e>
+                    </m:d>
+                    <m:r>
+                      <a:rPr lang="es-ES" sz="1400" b="1" i="0" smtClean="0">
+                        <a:latin typeface="Cambria Math" panose="02040503050406030204" pitchFamily="18" charset="0"/>
+                      </a:rPr>
+                      <m:t> +</m:t>
+                    </m:r>
+                  </m:oMath>
+                </a14:m>
+                <a:r>
+                  <a:rPr lang="es-ES" sz="1400" b="1" dirty="0"/>
+                  <a:t> </a:t>
+                </a:r>
+                <a14:m>
+                  <m:oMath xmlns:m="http://schemas.openxmlformats.org/officeDocument/2006/math">
+                    <m:sSub>
+                      <m:sSubPr>
+                        <m:ctrlPr>
+                          <a:rPr lang="es-ES" sz="1400" b="1" i="1" smtClean="0">
+                            <a:solidFill>
+                              <a:schemeClr val="tx2">
+                                <a:lumMod val="90000"/>
+                                <a:lumOff val="10000"/>
+                              </a:schemeClr>
+                            </a:solidFill>
+                            <a:latin typeface="Cambria Math" panose="02040503050406030204" pitchFamily="18" charset="0"/>
+                          </a:rPr>
+                        </m:ctrlPr>
+                      </m:sSubPr>
+                      <m:e>
+                        <m:r>
+                          <a:rPr lang="el-GR" sz="1400" b="1" i="1">
+                            <a:solidFill>
+                              <a:schemeClr val="tx2">
+                                <a:lumMod val="90000"/>
+                                <a:lumOff val="10000"/>
+                              </a:schemeClr>
+                            </a:solidFill>
+                            <a:latin typeface="Cambria Math" panose="02040503050406030204" pitchFamily="18" charset="0"/>
+                            <a:ea typeface="Cambria Math" panose="02040503050406030204" pitchFamily="18" charset="0"/>
+                          </a:rPr>
+                          <m:t>𝜶</m:t>
+                        </m:r>
+                      </m:e>
+                      <m:sub>
+                        <m:r>
+                          <m:rPr>
+                            <m:nor/>
+                          </m:rPr>
+                          <a:rPr lang="es-ES" sz="1400" b="1" i="0" smtClean="0">
+                            <a:solidFill>
+                              <a:schemeClr val="tx2">
+                                <a:lumMod val="90000"/>
+                                <a:lumOff val="10000"/>
+                              </a:schemeClr>
+                            </a:solidFill>
+                            <a:latin typeface="Cambria Math" panose="02040503050406030204" pitchFamily="18" charset="0"/>
+                          </a:rPr>
+                          <m:t>rec</m:t>
+                        </m:r>
+                      </m:sub>
+                    </m:sSub>
+                    <m:sSup>
+                      <m:sSupPr>
+                        <m:ctrlPr>
+                          <a:rPr lang="es-ES" sz="1400" b="1" i="1" smtClean="0">
+                            <a:latin typeface="Cambria Math" panose="02040503050406030204" pitchFamily="18" charset="0"/>
+                          </a:rPr>
+                        </m:ctrlPr>
+                      </m:sSupPr>
+                      <m:e>
+                        <m:r>
+                          <m:rPr>
+                            <m:nor/>
+                          </m:rPr>
+                          <a:rPr lang="es-ES" sz="1400" b="1" i="0" smtClean="0">
+                            <a:latin typeface="Cambria Math" panose="02040503050406030204" pitchFamily="18" charset="0"/>
+                          </a:rPr>
+                          <m:t> </m:t>
+                        </m:r>
+                        <m:r>
+                          <m:rPr>
+                            <m:nor/>
+                          </m:rPr>
+                          <a:rPr lang="es-ES" sz="1400" b="1">
+                            <a:latin typeface="Cambria Math" panose="02040503050406030204" pitchFamily="18" charset="0"/>
+                          </a:rPr>
+                          <m:t>0.995</m:t>
+                        </m:r>
+                      </m:e>
+                      <m:sup>
+                        <m:sSub>
+                          <m:sSubPr>
+                            <m:ctrlPr>
+                              <a:rPr lang="es-ES" sz="1400" b="1" i="1" smtClean="0">
+                                <a:latin typeface="Cambria Math" panose="02040503050406030204" pitchFamily="18" charset="0"/>
+                              </a:rPr>
+                            </m:ctrlPr>
+                          </m:sSubPr>
+                          <m:e>
+                            <m:r>
+                              <a:rPr lang="es-ES" sz="1400" b="1" i="1" smtClean="0">
+                                <a:latin typeface="Cambria Math" panose="02040503050406030204" pitchFamily="18" charset="0"/>
+                              </a:rPr>
+                              <m:t>𝒕</m:t>
+                            </m:r>
+                          </m:e>
+                          <m:sub>
+                            <m:r>
+                              <a:rPr lang="es-ES" sz="1400" b="1" i="1" smtClean="0">
+                                <a:latin typeface="Cambria Math" panose="02040503050406030204" pitchFamily="18" charset="0"/>
+                              </a:rPr>
+                              <m:t>𝒎</m:t>
+                            </m:r>
+                          </m:sub>
+                        </m:sSub>
+                      </m:sup>
+                    </m:sSup>
+                    <m:r>
+                      <a:rPr lang="es-ES" sz="1400" b="1">
+                        <a:latin typeface="Cambria Math" panose="02040503050406030204" pitchFamily="18" charset="0"/>
+                      </a:rPr>
+                      <m:t>+</m:t>
+                    </m:r>
+                  </m:oMath>
+                </a14:m>
+                <a:r>
+                  <a:rPr lang="es-ES" sz="1400" b="1" dirty="0"/>
+                  <a:t> </a:t>
+                </a:r>
+                <a14:m>
+                  <m:oMath xmlns:m="http://schemas.openxmlformats.org/officeDocument/2006/math">
+                    <m:sSub>
+                      <m:sSubPr>
+                        <m:ctrlPr>
+                          <a:rPr lang="es-ES" sz="1400" b="1" i="1" smtClean="0">
+                            <a:solidFill>
+                              <a:schemeClr val="tx2">
+                                <a:lumMod val="90000"/>
+                                <a:lumOff val="10000"/>
+                              </a:schemeClr>
+                            </a:solidFill>
+                            <a:latin typeface="Cambria Math" panose="02040503050406030204" pitchFamily="18" charset="0"/>
+                          </a:rPr>
+                        </m:ctrlPr>
+                      </m:sSubPr>
+                      <m:e>
+                        <m:r>
+                          <a:rPr lang="el-GR" sz="1400" b="1" i="1">
+                            <a:solidFill>
+                              <a:schemeClr val="tx2">
+                                <a:lumMod val="90000"/>
+                                <a:lumOff val="10000"/>
+                              </a:schemeClr>
+                            </a:solidFill>
+                            <a:latin typeface="Cambria Math" panose="02040503050406030204" pitchFamily="18" charset="0"/>
+                            <a:ea typeface="Cambria Math" panose="02040503050406030204" pitchFamily="18" charset="0"/>
+                          </a:rPr>
+                          <m:t>𝜶</m:t>
+                        </m:r>
+                      </m:e>
+                      <m:sub>
+                        <m:r>
+                          <m:rPr>
+                            <m:nor/>
+                          </m:rPr>
+                          <a:rPr lang="es-ES" sz="1400" b="1" i="0" smtClean="0">
+                            <a:solidFill>
+                              <a:schemeClr val="tx2">
+                                <a:lumMod val="90000"/>
+                                <a:lumOff val="10000"/>
+                              </a:schemeClr>
+                            </a:solidFill>
+                            <a:latin typeface="Cambria Math" panose="02040503050406030204" pitchFamily="18" charset="0"/>
+                          </a:rPr>
+                          <m:t>sim</m:t>
+                        </m:r>
+                      </m:sub>
+                    </m:sSub>
+                    <m:r>
+                      <m:rPr>
+                        <m:nor/>
+                      </m:rPr>
+                      <a:rPr lang="es-ES" sz="1400" b="1" i="0" smtClean="0">
+                        <a:latin typeface="Cambria Math" panose="02040503050406030204" pitchFamily="18" charset="0"/>
+                      </a:rPr>
+                      <m:t> </m:t>
+                    </m:r>
+                    <m:r>
+                      <m:rPr>
+                        <m:nor/>
+                      </m:rPr>
+                      <a:rPr lang="es-ES" sz="1400" b="1" i="0" smtClean="0">
+                        <a:latin typeface="Cambria Math" panose="02040503050406030204" pitchFamily="18" charset="0"/>
+                      </a:rPr>
+                      <m:t>vector</m:t>
+                    </m:r>
+                    <m:r>
+                      <m:rPr>
+                        <m:nor/>
+                      </m:rPr>
+                      <a:rPr lang="es-ES" sz="1400" b="1" i="0" smtClean="0">
+                        <a:latin typeface="Cambria Math" panose="02040503050406030204" pitchFamily="18" charset="0"/>
+                      </a:rPr>
+                      <m:t>_</m:t>
+                    </m:r>
+                    <m:r>
+                      <m:rPr>
+                        <m:nor/>
+                      </m:rPr>
+                      <a:rPr lang="es-ES" sz="1400" b="1" i="0" smtClean="0">
+                        <a:latin typeface="Cambria Math" panose="02040503050406030204" pitchFamily="18" charset="0"/>
+                      </a:rPr>
+                      <m:t>similarity</m:t>
+                    </m:r>
+                    <m:d>
+                      <m:dPr>
+                        <m:ctrlPr>
+                          <a:rPr lang="es-ES" sz="1400" b="1" i="1">
+                            <a:latin typeface="Cambria Math" panose="02040503050406030204" pitchFamily="18" charset="0"/>
+                          </a:rPr>
+                        </m:ctrlPr>
+                      </m:dPr>
+                      <m:e>
+                        <m:r>
+                          <a:rPr lang="es-ES" sz="1400" b="1" i="1">
+                            <a:latin typeface="Cambria Math" panose="02040503050406030204" pitchFamily="18" charset="0"/>
+                          </a:rPr>
+                          <m:t>𝒎</m:t>
+                        </m:r>
+                        <m:r>
+                          <a:rPr lang="es-ES" sz="1400" b="1" i="1" smtClean="0">
+                            <a:latin typeface="Cambria Math" panose="02040503050406030204" pitchFamily="18" charset="0"/>
+                          </a:rPr>
+                          <m:t>,</m:t>
+                        </m:r>
+                        <m:r>
+                          <a:rPr lang="es-ES" sz="1400" b="1" i="1" smtClean="0">
+                            <a:latin typeface="Cambria Math" panose="02040503050406030204" pitchFamily="18" charset="0"/>
+                          </a:rPr>
+                          <m:t>𝒒</m:t>
+                        </m:r>
+                      </m:e>
+                    </m:d>
+                  </m:oMath>
+                </a14:m>
+                <a:endParaRPr lang="en-US" sz="1400" b="1" dirty="0"/>
+              </a:p>
+            </p:txBody>
+          </p:sp>
+        </mc:Choice>
+        <mc:Fallback>
+          <p:sp>
+            <p:nvSpPr>
+              <p:cNvPr id="2" name="TextBox 1">
+                <a:extLst>
+                  <a:ext uri="{FF2B5EF4-FFF2-40B4-BE49-F238E27FC236}">
+                    <a16:creationId xmlns:a16="http://schemas.microsoft.com/office/drawing/2014/main" id="{5C49B147-5917-209A-20BC-82E3A1E39701}"/>
+                  </a:ext>
+                </a:extLst>
+              </p:cNvPr>
+              <p:cNvSpPr txBox="1">
+                <a:spLocks noRot="1" noChangeAspect="1" noMove="1" noResize="1" noEditPoints="1" noAdjustHandles="1" noChangeArrowheads="1" noChangeShapeType="1" noTextEdit="1"/>
+              </p:cNvSpPr>
+              <p:nvPr/>
+            </p:nvSpPr>
+            <p:spPr>
+              <a:xfrm>
+                <a:off x="8676736" y="5265647"/>
+                <a:ext cx="2485845" cy="1344086"/>
+              </a:xfrm>
+              <a:prstGeom prst="rect">
+                <a:avLst/>
+              </a:prstGeom>
+              <a:blipFill>
+                <a:blip r:embed="rId2"/>
+                <a:stretch>
+                  <a:fillRect/>
+                </a:stretch>
+              </a:blipFill>
+              <a:effectLst>
+                <a:outerShdw blurRad="50800" dist="38100" dir="2700000" algn="tl" rotWithShape="0">
+                  <a:prstClr val="black">
+                    <a:alpha val="40000"/>
+                  </a:prstClr>
+                </a:outerShdw>
+              </a:effectLst>
+            </p:spPr>
+            <p:txBody>
+              <a:bodyPr/>
+              <a:lstStyle/>
+              <a:p>
+                <a:r>
+                  <a:rPr lang="en-US">
+                    <a:noFill/>
+                  </a:rPr>
+                  <a:t> </a:t>
+                </a:r>
+              </a:p>
+            </p:txBody>
+          </p:sp>
+        </mc:Fallback>
+      </mc:AlternateContent>
+      <mc:AlternateContent xmlns:mc="http://schemas.openxmlformats.org/markup-compatibility/2006">
+        <mc:Choice xmlns:a14="http://schemas.microsoft.com/office/drawing/2010/main" Requires="a14">
+          <p:sp>
+            <p:nvSpPr>
+              <p:cNvPr id="3" name="TextBox 2">
+                <a:extLst>
+                  <a:ext uri="{FF2B5EF4-FFF2-40B4-BE49-F238E27FC236}">
+                    <a16:creationId xmlns:a16="http://schemas.microsoft.com/office/drawing/2014/main" id="{7FD723BA-D8DA-9585-8D12-63F8B5516A35}"/>
+                  </a:ext>
+                </a:extLst>
+              </p:cNvPr>
+              <p:cNvSpPr txBox="1"/>
+              <p:nvPr/>
+            </p:nvSpPr>
+            <p:spPr>
+              <a:xfrm>
+                <a:off x="8019690" y="2916510"/>
+                <a:ext cx="3988280" cy="2222211"/>
+              </a:xfrm>
+              <a:prstGeom prst="rect">
+                <a:avLst/>
+              </a:prstGeom>
+              <a:noFill/>
+            </p:spPr>
+            <p:txBody>
+              <a:bodyPr wrap="square" lIns="0" tIns="0" rIns="0" bIns="0" rtlCol="0">
+                <a:spAutoFit/>
+              </a:bodyPr>
+              <a:lstStyle/>
+              <a:p>
+                <a:pPr>
+                  <a:lnSpc>
+                    <a:spcPct val="150000"/>
+                  </a:lnSpc>
+                </a:pPr>
+                <a:r>
+                  <a:rPr lang="es-ES" sz="1400" dirty="0">
+                    <a:solidFill>
+                      <a:schemeClr val="bg1"/>
+                    </a:solidFill>
+                  </a:rPr>
+                  <a:t>When </a:t>
+                </a:r>
+                <a:r>
+                  <a:rPr lang="es-ES" sz="1400" dirty="0" err="1">
+                    <a:solidFill>
+                      <a:schemeClr val="bg1"/>
+                    </a:solidFill>
+                  </a:rPr>
+                  <a:t>searching</a:t>
+                </a:r>
+                <a:r>
+                  <a:rPr lang="es-ES" sz="1400" dirty="0">
+                    <a:solidFill>
+                      <a:schemeClr val="bg1"/>
+                    </a:solidFill>
+                  </a:rPr>
+                  <a:t> for </a:t>
+                </a:r>
+                <a:r>
+                  <a:rPr lang="es-ES" sz="1400" dirty="0" err="1">
+                    <a:solidFill>
+                      <a:schemeClr val="bg1"/>
+                    </a:solidFill>
+                  </a:rPr>
+                  <a:t>query</a:t>
+                </a:r>
+                <a:r>
+                  <a:rPr lang="es-ES" sz="1400" dirty="0">
+                    <a:solidFill>
+                      <a:schemeClr val="bg1"/>
+                    </a:solidFill>
+                  </a:rPr>
+                  <a:t> </a:t>
+                </a:r>
+                <a14:m>
+                  <m:oMath xmlns:m="http://schemas.openxmlformats.org/officeDocument/2006/math">
+                    <m:r>
+                      <a:rPr lang="es-ES" sz="1400" i="1">
+                        <a:solidFill>
+                          <a:schemeClr val="bg1"/>
+                        </a:solidFill>
+                        <a:latin typeface="Cambria Math" panose="02040503050406030204" pitchFamily="18" charset="0"/>
+                      </a:rPr>
+                      <m:t>𝑞</m:t>
+                    </m:r>
+                    <m:r>
+                      <a:rPr lang="es-ES" sz="1400" i="1">
+                        <a:solidFill>
+                          <a:schemeClr val="bg1"/>
+                        </a:solidFill>
+                        <a:latin typeface="Cambria Math" panose="02040503050406030204" pitchFamily="18" charset="0"/>
+                      </a:rPr>
+                      <m:t> </m:t>
+                    </m:r>
+                  </m:oMath>
+                </a14:m>
+                <a:r>
+                  <a:rPr lang="es-ES" sz="1400" dirty="0">
+                    <a:solidFill>
+                      <a:schemeClr val="bg1"/>
+                    </a:solidFill>
+                  </a:rPr>
+                  <a:t>, the score </a:t>
+                </a:r>
+                <a:r>
+                  <a:rPr lang="es-ES" sz="1400" dirty="0" err="1">
+                    <a:solidFill>
+                      <a:schemeClr val="bg1"/>
+                    </a:solidFill>
+                  </a:rPr>
+                  <a:t>of</a:t>
+                </a:r>
+                <a:r>
+                  <a:rPr lang="es-ES" sz="1400" dirty="0">
+                    <a:solidFill>
+                      <a:schemeClr val="bg1"/>
+                    </a:solidFill>
+                  </a:rPr>
+                  <a:t> </a:t>
+                </a:r>
+                <a:r>
+                  <a:rPr lang="es-ES" sz="1400" dirty="0" err="1">
+                    <a:solidFill>
+                      <a:schemeClr val="bg1"/>
+                    </a:solidFill>
+                  </a:rPr>
+                  <a:t>each</a:t>
+                </a:r>
+                <a:r>
+                  <a:rPr lang="es-ES" sz="1400" dirty="0">
+                    <a:solidFill>
+                      <a:schemeClr val="bg1"/>
+                    </a:solidFill>
+                  </a:rPr>
+                  <a:t> </a:t>
+                </a:r>
+                <a:r>
+                  <a:rPr lang="es-ES" sz="1400" dirty="0" err="1">
+                    <a:solidFill>
+                      <a:schemeClr val="bg1"/>
+                    </a:solidFill>
+                  </a:rPr>
+                  <a:t>memory</a:t>
+                </a:r>
+                <a:r>
+                  <a:rPr lang="es-ES" sz="1400" dirty="0">
+                    <a:solidFill>
+                      <a:schemeClr val="bg1"/>
+                    </a:solidFill>
+                  </a:rPr>
+                  <a:t> </a:t>
+                </a:r>
+                <a14:m>
+                  <m:oMath xmlns:m="http://schemas.openxmlformats.org/officeDocument/2006/math">
+                    <m:r>
+                      <a:rPr lang="es-ES" sz="1400" b="0" i="1" smtClean="0">
+                        <a:solidFill>
+                          <a:schemeClr val="bg1"/>
+                        </a:solidFill>
+                        <a:latin typeface="Cambria Math" panose="02040503050406030204" pitchFamily="18" charset="0"/>
+                      </a:rPr>
+                      <m:t>𝑚</m:t>
+                    </m:r>
+                  </m:oMath>
+                </a14:m>
+                <a:r>
+                  <a:rPr lang="es-ES" sz="1400" dirty="0">
+                    <a:solidFill>
+                      <a:schemeClr val="bg1"/>
+                    </a:solidFill>
+                  </a:rPr>
+                  <a:t>, </a:t>
+                </a:r>
+                <a:r>
+                  <a:rPr lang="es-ES" sz="1400" dirty="0" err="1">
+                    <a:solidFill>
+                      <a:schemeClr val="bg1"/>
+                    </a:solidFill>
+                  </a:rPr>
+                  <a:t>created</a:t>
+                </a:r>
+                <a:r>
+                  <a:rPr lang="es-ES" sz="1400" dirty="0">
+                    <a:solidFill>
+                      <a:schemeClr val="bg1"/>
+                    </a:solidFill>
+                  </a:rPr>
+                  <a:t> </a:t>
+                </a:r>
+                <a14:m>
+                  <m:oMath xmlns:m="http://schemas.openxmlformats.org/officeDocument/2006/math">
+                    <m:sSub>
+                      <m:sSubPr>
+                        <m:ctrlPr>
+                          <a:rPr lang="es-ES" sz="1400" i="1">
+                            <a:solidFill>
+                              <a:schemeClr val="bg1"/>
+                            </a:solidFill>
+                            <a:latin typeface="Cambria Math" panose="02040503050406030204" pitchFamily="18" charset="0"/>
+                          </a:rPr>
+                        </m:ctrlPr>
+                      </m:sSubPr>
+                      <m:e>
+                        <m:r>
+                          <a:rPr lang="es-ES" sz="1400" i="1">
+                            <a:solidFill>
+                              <a:schemeClr val="bg1"/>
+                            </a:solidFill>
+                            <a:latin typeface="Cambria Math" panose="02040503050406030204" pitchFamily="18" charset="0"/>
+                          </a:rPr>
+                          <m:t>𝑡</m:t>
+                        </m:r>
+                      </m:e>
+                      <m:sub>
+                        <m:r>
+                          <a:rPr lang="es-ES" sz="1400" i="1">
+                            <a:solidFill>
+                              <a:schemeClr val="bg1"/>
+                            </a:solidFill>
+                            <a:latin typeface="Cambria Math" panose="02040503050406030204" pitchFamily="18" charset="0"/>
+                          </a:rPr>
+                          <m:t>𝑚</m:t>
+                        </m:r>
+                      </m:sub>
+                    </m:sSub>
+                  </m:oMath>
+                </a14:m>
+                <a:r>
+                  <a:rPr lang="es-ES" sz="1400" dirty="0">
+                    <a:solidFill>
+                      <a:schemeClr val="bg1"/>
+                    </a:solidFill>
+                  </a:rPr>
+                  <a:t> time </a:t>
+                </a:r>
+                <a:r>
+                  <a:rPr lang="es-ES" sz="1400" dirty="0" err="1">
+                    <a:solidFill>
+                      <a:schemeClr val="bg1"/>
+                    </a:solidFill>
+                  </a:rPr>
+                  <a:t>ago</a:t>
+                </a:r>
+                <a:r>
+                  <a:rPr lang="es-ES" sz="1400" dirty="0">
+                    <a:solidFill>
+                      <a:schemeClr val="bg1"/>
+                    </a:solidFill>
+                  </a:rPr>
+                  <a:t> (</a:t>
+                </a:r>
+                <a:r>
+                  <a:rPr lang="es-ES" sz="1400" dirty="0" err="1">
+                    <a:solidFill>
+                      <a:schemeClr val="bg1"/>
+                    </a:solidFill>
+                  </a:rPr>
+                  <a:t>recency</a:t>
+                </a:r>
+                <a:r>
+                  <a:rPr lang="es-ES" sz="1400" dirty="0">
+                    <a:solidFill>
+                      <a:schemeClr val="bg1"/>
+                    </a:solidFill>
+                  </a:rPr>
+                  <a:t>) can be </a:t>
+                </a:r>
+                <a:r>
+                  <a:rPr lang="es-ES" sz="1400" dirty="0" err="1">
+                    <a:solidFill>
+                      <a:schemeClr val="bg1"/>
+                    </a:solidFill>
+                  </a:rPr>
+                  <a:t>calculated</a:t>
+                </a:r>
+                <a:r>
+                  <a:rPr lang="es-ES" sz="1400" dirty="0">
+                    <a:solidFill>
+                      <a:schemeClr val="bg1"/>
+                    </a:solidFill>
+                  </a:rPr>
+                  <a:t> as a </a:t>
+                </a:r>
+                <a:r>
+                  <a:rPr lang="es-ES" sz="1400" dirty="0" err="1">
+                    <a:solidFill>
+                      <a:schemeClr val="bg1"/>
+                    </a:solidFill>
+                  </a:rPr>
+                  <a:t>weighted</a:t>
+                </a:r>
+                <a:r>
+                  <a:rPr lang="es-ES" sz="1400" dirty="0">
+                    <a:solidFill>
+                      <a:schemeClr val="bg1"/>
+                    </a:solidFill>
+                  </a:rPr>
+                  <a:t> </a:t>
+                </a:r>
+                <a:r>
+                  <a:rPr lang="es-ES" sz="1400" dirty="0" err="1">
+                    <a:solidFill>
+                      <a:schemeClr val="bg1"/>
+                    </a:solidFill>
+                  </a:rPr>
+                  <a:t>combination</a:t>
+                </a:r>
+                <a:r>
+                  <a:rPr lang="es-ES" sz="1400" dirty="0">
+                    <a:solidFill>
+                      <a:schemeClr val="bg1"/>
+                    </a:solidFill>
+                  </a:rPr>
+                  <a:t> </a:t>
+                </a:r>
+                <a:r>
+                  <a:rPr lang="es-ES" sz="1400" dirty="0" err="1">
+                    <a:solidFill>
+                      <a:schemeClr val="bg1"/>
+                    </a:solidFill>
+                  </a:rPr>
+                  <a:t>of</a:t>
+                </a:r>
+                <a:r>
+                  <a:rPr lang="es-ES" sz="1400" dirty="0">
+                    <a:solidFill>
+                      <a:schemeClr val="bg1"/>
+                    </a:solidFill>
+                  </a:rPr>
+                  <a:t>:</a:t>
+                </a:r>
+              </a:p>
+              <a:p>
+                <a:pPr marL="285750" indent="-285750">
+                  <a:lnSpc>
+                    <a:spcPct val="150000"/>
+                  </a:lnSpc>
+                  <a:buFontTx/>
+                  <a:buChar char="-"/>
+                </a:pPr>
+                <a:r>
+                  <a:rPr lang="es-ES" sz="1400" b="1" dirty="0" err="1">
+                    <a:solidFill>
+                      <a:schemeClr val="bg1"/>
+                    </a:solidFill>
+                  </a:rPr>
+                  <a:t>Importance</a:t>
+                </a:r>
+                <a:r>
+                  <a:rPr lang="es-ES" sz="1400" dirty="0">
+                    <a:solidFill>
+                      <a:schemeClr val="bg1"/>
+                    </a:solidFill>
+                  </a:rPr>
+                  <a:t> </a:t>
+                </a:r>
+                <a:r>
+                  <a:rPr lang="es-ES" sz="1400" dirty="0" err="1">
+                    <a:solidFill>
+                      <a:schemeClr val="bg1"/>
+                    </a:solidFill>
+                  </a:rPr>
+                  <a:t>of</a:t>
+                </a:r>
+                <a:r>
+                  <a:rPr lang="es-ES" sz="1400" dirty="0">
+                    <a:solidFill>
+                      <a:schemeClr val="bg1"/>
+                    </a:solidFill>
+                  </a:rPr>
+                  <a:t> the </a:t>
+                </a:r>
+                <a:r>
+                  <a:rPr lang="es-ES" sz="1400" dirty="0" err="1">
+                    <a:solidFill>
+                      <a:schemeClr val="bg1"/>
+                    </a:solidFill>
+                  </a:rPr>
+                  <a:t>memory</a:t>
+                </a:r>
+                <a:endParaRPr lang="es-ES" sz="1400" dirty="0">
+                  <a:solidFill>
+                    <a:schemeClr val="bg1"/>
+                  </a:solidFill>
+                </a:endParaRPr>
+              </a:p>
+              <a:p>
+                <a:pPr marL="285750" indent="-285750">
+                  <a:lnSpc>
+                    <a:spcPct val="150000"/>
+                  </a:lnSpc>
+                  <a:buFontTx/>
+                  <a:buChar char="-"/>
+                </a:pPr>
+                <a:r>
+                  <a:rPr lang="es-ES" sz="1400" b="1" dirty="0" err="1">
+                    <a:solidFill>
+                      <a:schemeClr val="bg1"/>
+                    </a:solidFill>
+                  </a:rPr>
+                  <a:t>Recency</a:t>
+                </a:r>
+                <a:r>
+                  <a:rPr lang="es-ES" sz="1400" dirty="0">
+                    <a:solidFill>
+                      <a:schemeClr val="bg1"/>
+                    </a:solidFill>
+                  </a:rPr>
+                  <a:t> (</a:t>
+                </a:r>
+                <a:r>
+                  <a:rPr lang="es-ES" sz="1400" dirty="0" err="1">
+                    <a:solidFill>
+                      <a:schemeClr val="bg1"/>
+                    </a:solidFill>
+                  </a:rPr>
+                  <a:t>exp</a:t>
+                </a:r>
+                <a:r>
+                  <a:rPr lang="es-ES" sz="1400" dirty="0">
+                    <a:solidFill>
+                      <a:schemeClr val="bg1"/>
+                    </a:solidFill>
+                  </a:rPr>
+                  <a:t>) </a:t>
+                </a:r>
+                <a:r>
+                  <a:rPr lang="es-ES" sz="1400" dirty="0" err="1">
+                    <a:solidFill>
+                      <a:schemeClr val="bg1"/>
+                    </a:solidFill>
+                  </a:rPr>
+                  <a:t>of</a:t>
+                </a:r>
+                <a:r>
+                  <a:rPr lang="es-ES" sz="1400" dirty="0">
+                    <a:solidFill>
+                      <a:schemeClr val="bg1"/>
+                    </a:solidFill>
+                  </a:rPr>
+                  <a:t> the </a:t>
+                </a:r>
+                <a:r>
+                  <a:rPr lang="es-ES" sz="1400" dirty="0" err="1">
+                    <a:solidFill>
+                      <a:schemeClr val="bg1"/>
+                    </a:solidFill>
+                  </a:rPr>
+                  <a:t>memory</a:t>
+                </a:r>
+                <a:endParaRPr lang="es-ES" sz="1400" dirty="0">
+                  <a:solidFill>
+                    <a:schemeClr val="bg1"/>
+                  </a:solidFill>
+                </a:endParaRPr>
+              </a:p>
+              <a:p>
+                <a:pPr marL="285750" indent="-285750">
+                  <a:lnSpc>
+                    <a:spcPct val="150000"/>
+                  </a:lnSpc>
+                  <a:buFontTx/>
+                  <a:buChar char="-"/>
+                </a:pPr>
+                <a:r>
+                  <a:rPr lang="es-ES" sz="1400" b="1" dirty="0">
+                    <a:solidFill>
+                      <a:schemeClr val="bg1"/>
+                    </a:solidFill>
+                  </a:rPr>
+                  <a:t>Vector</a:t>
+                </a:r>
+                <a:r>
+                  <a:rPr lang="es-ES" sz="1400" dirty="0">
+                    <a:solidFill>
+                      <a:schemeClr val="bg1"/>
+                    </a:solidFill>
+                  </a:rPr>
+                  <a:t> </a:t>
+                </a:r>
+                <a:r>
+                  <a:rPr lang="es-ES" sz="1400" b="1" dirty="0" err="1">
+                    <a:solidFill>
+                      <a:schemeClr val="bg1"/>
+                    </a:solidFill>
+                  </a:rPr>
+                  <a:t>Similarity</a:t>
+                </a:r>
+                <a:r>
+                  <a:rPr lang="es-ES" sz="1400" b="1" dirty="0">
+                    <a:solidFill>
+                      <a:schemeClr val="bg1"/>
+                    </a:solidFill>
+                  </a:rPr>
+                  <a:t> </a:t>
+                </a:r>
+                <a:r>
+                  <a:rPr lang="es-ES" sz="1400" b="1" dirty="0" err="1">
+                    <a:solidFill>
+                      <a:schemeClr val="bg1"/>
+                    </a:solidFill>
+                  </a:rPr>
+                  <a:t>betwen</a:t>
+                </a:r>
+                <a:r>
+                  <a:rPr lang="es-ES" sz="1400" b="1" dirty="0">
+                    <a:solidFill>
+                      <a:schemeClr val="bg1"/>
+                    </a:solidFill>
+                  </a:rPr>
+                  <a:t> </a:t>
+                </a:r>
+                <a:r>
+                  <a:rPr lang="es-ES" sz="1400" b="1" dirty="0" err="1">
+                    <a:solidFill>
+                      <a:schemeClr val="bg1"/>
+                    </a:solidFill>
+                  </a:rPr>
+                  <a:t>query</a:t>
+                </a:r>
+                <a:r>
+                  <a:rPr lang="es-ES" sz="1400" b="1" dirty="0">
+                    <a:solidFill>
+                      <a:schemeClr val="bg1"/>
+                    </a:solidFill>
+                  </a:rPr>
+                  <a:t> and </a:t>
+                </a:r>
+                <a:r>
+                  <a:rPr lang="es-ES" sz="1400" b="1" dirty="0" err="1">
+                    <a:solidFill>
+                      <a:schemeClr val="bg1"/>
+                    </a:solidFill>
+                  </a:rPr>
+                  <a:t>memory</a:t>
+                </a:r>
+                <a:endParaRPr lang="es-ES" sz="1400" dirty="0">
+                  <a:solidFill>
+                    <a:schemeClr val="bg1"/>
+                  </a:solidFill>
+                </a:endParaRPr>
+              </a:p>
+              <a:p>
+                <a:pPr>
+                  <a:lnSpc>
+                    <a:spcPct val="150000"/>
+                  </a:lnSpc>
+                </a:pPr>
+                <a:endParaRPr lang="es-ES" sz="1400" i="1" dirty="0">
+                  <a:solidFill>
+                    <a:schemeClr val="bg1"/>
+                  </a:solidFill>
+                  <a:latin typeface="Cambria Math" panose="02040503050406030204" pitchFamily="18" charset="0"/>
+                </a:endParaRPr>
+              </a:p>
+            </p:txBody>
+          </p:sp>
+        </mc:Choice>
+        <mc:Fallback>
+          <p:sp>
+            <p:nvSpPr>
+              <p:cNvPr id="3" name="TextBox 2">
+                <a:extLst>
+                  <a:ext uri="{FF2B5EF4-FFF2-40B4-BE49-F238E27FC236}">
+                    <a16:creationId xmlns:a16="http://schemas.microsoft.com/office/drawing/2014/main" id="{7FD723BA-D8DA-9585-8D12-63F8B5516A35}"/>
+                  </a:ext>
+                </a:extLst>
+              </p:cNvPr>
+              <p:cNvSpPr txBox="1">
+                <a:spLocks noRot="1" noChangeAspect="1" noMove="1" noResize="1" noEditPoints="1" noAdjustHandles="1" noChangeArrowheads="1" noChangeShapeType="1" noTextEdit="1"/>
+              </p:cNvSpPr>
+              <p:nvPr/>
+            </p:nvSpPr>
+            <p:spPr>
+              <a:xfrm>
+                <a:off x="8019690" y="2916510"/>
+                <a:ext cx="3988280" cy="2222211"/>
+              </a:xfrm>
+              <a:prstGeom prst="rect">
+                <a:avLst/>
+              </a:prstGeom>
+              <a:blipFill>
+                <a:blip r:embed="rId3"/>
+                <a:stretch>
+                  <a:fillRect l="-2905" r="-3211"/>
+                </a:stretch>
+              </a:blipFill>
+            </p:spPr>
+            <p:txBody>
+              <a:bodyPr/>
+              <a:lstStyle/>
+              <a:p>
+                <a:r>
+                  <a:rPr lang="en-US">
+                    <a:noFill/>
+                  </a:rPr>
+                  <a:t> </a:t>
+                </a:r>
+              </a:p>
+            </p:txBody>
+          </p:sp>
+        </mc:Fallback>
+      </mc:AlternateContent>
+      <p:pic>
+        <p:nvPicPr>
+          <p:cNvPr id="12" name="Picture 11">
+            <a:extLst>
+              <a:ext uri="{FF2B5EF4-FFF2-40B4-BE49-F238E27FC236}">
+                <a16:creationId xmlns:a16="http://schemas.microsoft.com/office/drawing/2014/main" id="{BFED0048-C58D-AF80-18D1-CF6182D5CAF8}"/>
+              </a:ext>
+            </a:extLst>
+          </p:cNvPr>
+          <p:cNvPicPr>
+            <a:picLocks noChangeAspect="1"/>
+          </p:cNvPicPr>
+          <p:nvPr/>
+        </p:nvPicPr>
+        <p:blipFill>
+          <a:blip r:embed="rId4"/>
+          <a:stretch>
+            <a:fillRect/>
+          </a:stretch>
+        </p:blipFill>
+        <p:spPr>
+          <a:xfrm>
+            <a:off x="1020582" y="330315"/>
+            <a:ext cx="4989366" cy="5172389"/>
+          </a:xfrm>
+          <a:prstGeom prst="rect">
+            <a:avLst/>
+          </a:prstGeom>
+        </p:spPr>
+      </p:pic>
+      <p:pic>
+        <p:nvPicPr>
+          <p:cNvPr id="14" name="Picture 13">
+            <a:extLst>
+              <a:ext uri="{FF2B5EF4-FFF2-40B4-BE49-F238E27FC236}">
+                <a16:creationId xmlns:a16="http://schemas.microsoft.com/office/drawing/2014/main" id="{F3DBD3BE-38D6-99D9-B290-735AA61255BF}"/>
+              </a:ext>
+            </a:extLst>
+          </p:cNvPr>
+          <p:cNvPicPr>
+            <a:picLocks noChangeAspect="1"/>
+          </p:cNvPicPr>
+          <p:nvPr/>
+        </p:nvPicPr>
+        <p:blipFill>
+          <a:blip r:embed="rId5"/>
+          <a:stretch>
+            <a:fillRect/>
+          </a:stretch>
+        </p:blipFill>
+        <p:spPr>
+          <a:xfrm>
+            <a:off x="1020582" y="5588957"/>
+            <a:ext cx="4999930" cy="966170"/>
+          </a:xfrm>
+          <a:prstGeom prst="rect">
+            <a:avLst/>
+          </a:prstGeom>
+        </p:spPr>
+      </p:pic>
+    </p:spTree>
+    <p:extLst>
+      <p:ext uri="{BB962C8B-B14F-4D97-AF65-F5344CB8AC3E}">
+        <p14:creationId xmlns:p14="http://schemas.microsoft.com/office/powerpoint/2010/main" val="2516498561"/>
       </p:ext>
     </p:extLst>
   </p:cSld>

</xml_diff>